<commit_message>
presentation: version that was first sent to Moshe
</commit_message>
<xml_diff>
--- a/PAPR Reduction- PTS.pptx
+++ b/PAPR Reduction- PTS.pptx
@@ -5,7 +5,7 @@
     <p:sldMasterId id="2147483648" r:id="rId1"/>
   </p:sldMasterIdLst>
   <p:notesMasterIdLst>
-    <p:notesMasterId r:id="rId46"/>
+    <p:notesMasterId r:id="rId44"/>
   </p:notesMasterIdLst>
   <p:sldIdLst>
     <p:sldId id="256" r:id="rId2"/>
@@ -21,37 +21,35 @@
     <p:sldId id="278" r:id="rId12"/>
     <p:sldId id="279" r:id="rId13"/>
     <p:sldId id="280" r:id="rId14"/>
-    <p:sldId id="271" r:id="rId15"/>
-    <p:sldId id="259" r:id="rId16"/>
-    <p:sldId id="287" r:id="rId17"/>
-    <p:sldId id="288" r:id="rId18"/>
-    <p:sldId id="289" r:id="rId19"/>
-    <p:sldId id="284" r:id="rId20"/>
-    <p:sldId id="290" r:id="rId21"/>
-    <p:sldId id="291" r:id="rId22"/>
-    <p:sldId id="292" r:id="rId23"/>
-    <p:sldId id="293" r:id="rId24"/>
-    <p:sldId id="294" r:id="rId25"/>
-    <p:sldId id="295" r:id="rId26"/>
-    <p:sldId id="301" r:id="rId27"/>
-    <p:sldId id="303" r:id="rId28"/>
-    <p:sldId id="304" r:id="rId29"/>
-    <p:sldId id="297" r:id="rId30"/>
-    <p:sldId id="298" r:id="rId31"/>
-    <p:sldId id="307" r:id="rId32"/>
-    <p:sldId id="309" r:id="rId33"/>
-    <p:sldId id="305" r:id="rId34"/>
-    <p:sldId id="302" r:id="rId35"/>
-    <p:sldId id="300" r:id="rId36"/>
-    <p:sldId id="310" r:id="rId37"/>
-    <p:sldId id="262" r:id="rId38"/>
-    <p:sldId id="313" r:id="rId39"/>
-    <p:sldId id="317" r:id="rId40"/>
-    <p:sldId id="314" r:id="rId41"/>
-    <p:sldId id="315" r:id="rId42"/>
-    <p:sldId id="316" r:id="rId43"/>
-    <p:sldId id="312" r:id="rId44"/>
-    <p:sldId id="273" r:id="rId45"/>
+    <p:sldId id="259" r:id="rId15"/>
+    <p:sldId id="287" r:id="rId16"/>
+    <p:sldId id="288" r:id="rId17"/>
+    <p:sldId id="289" r:id="rId18"/>
+    <p:sldId id="284" r:id="rId19"/>
+    <p:sldId id="290" r:id="rId20"/>
+    <p:sldId id="291" r:id="rId21"/>
+    <p:sldId id="292" r:id="rId22"/>
+    <p:sldId id="293" r:id="rId23"/>
+    <p:sldId id="294" r:id="rId24"/>
+    <p:sldId id="295" r:id="rId25"/>
+    <p:sldId id="301" r:id="rId26"/>
+    <p:sldId id="303" r:id="rId27"/>
+    <p:sldId id="304" r:id="rId28"/>
+    <p:sldId id="297" r:id="rId29"/>
+    <p:sldId id="298" r:id="rId30"/>
+    <p:sldId id="307" r:id="rId31"/>
+    <p:sldId id="309" r:id="rId32"/>
+    <p:sldId id="305" r:id="rId33"/>
+    <p:sldId id="302" r:id="rId34"/>
+    <p:sldId id="300" r:id="rId35"/>
+    <p:sldId id="310" r:id="rId36"/>
+    <p:sldId id="262" r:id="rId37"/>
+    <p:sldId id="313" r:id="rId38"/>
+    <p:sldId id="317" r:id="rId39"/>
+    <p:sldId id="315" r:id="rId40"/>
+    <p:sldId id="316" r:id="rId41"/>
+    <p:sldId id="312" r:id="rId42"/>
+    <p:sldId id="273" r:id="rId43"/>
   </p:sldIdLst>
   <p:sldSz cx="12192000" cy="6858000"/>
   <p:notesSz cx="6858000" cy="9144000"/>
@@ -240,7 +238,7 @@
           <a:p>
             <a:fld id="{9D4DBBD4-50DD-45D8-920D-439F8E5106DA}" type="datetimeFigureOut">
               <a:rPr lang="en-US" smtClean="0"/>
-              <a:t>10/7/2017</a:t>
+              <a:t>10/11/2017</a:t>
             </a:fld>
             <a:endParaRPr lang="en-US"/>
           </a:p>
@@ -581,7 +579,7 @@
           <a:p>
             <a:fld id="{F80C31EE-3423-46B3-BE0B-167A1707562B}" type="slidenum">
               <a:rPr lang="en-US" smtClean="0"/>
-              <a:t>34</a:t>
+              <a:t>33</a:t>
             </a:fld>
             <a:endParaRPr lang="en-US"/>
           </a:p>
@@ -731,7 +729,7 @@
           <a:p>
             <a:fld id="{0FFA1DB2-F186-40A4-8E7C-447CEF618330}" type="datetimeFigureOut">
               <a:rPr lang="en-US" smtClean="0"/>
-              <a:t>10/7/2017</a:t>
+              <a:t>10/11/2017</a:t>
             </a:fld>
             <a:endParaRPr lang="en-US"/>
           </a:p>
@@ -901,7 +899,7 @@
           <a:p>
             <a:fld id="{0FFA1DB2-F186-40A4-8E7C-447CEF618330}" type="datetimeFigureOut">
               <a:rPr lang="en-US" smtClean="0"/>
-              <a:t>10/7/2017</a:t>
+              <a:t>10/11/2017</a:t>
             </a:fld>
             <a:endParaRPr lang="en-US"/>
           </a:p>
@@ -1081,7 +1079,7 @@
           <a:p>
             <a:fld id="{0FFA1DB2-F186-40A4-8E7C-447CEF618330}" type="datetimeFigureOut">
               <a:rPr lang="en-US" smtClean="0"/>
-              <a:t>10/7/2017</a:t>
+              <a:t>10/11/2017</a:t>
             </a:fld>
             <a:endParaRPr lang="en-US"/>
           </a:p>
@@ -1251,7 +1249,7 @@
           <a:p>
             <a:fld id="{0FFA1DB2-F186-40A4-8E7C-447CEF618330}" type="datetimeFigureOut">
               <a:rPr lang="en-US" smtClean="0"/>
-              <a:t>10/7/2017</a:t>
+              <a:t>10/11/2017</a:t>
             </a:fld>
             <a:endParaRPr lang="en-US"/>
           </a:p>
@@ -1497,7 +1495,7 @@
           <a:p>
             <a:fld id="{0FFA1DB2-F186-40A4-8E7C-447CEF618330}" type="datetimeFigureOut">
               <a:rPr lang="en-US" smtClean="0"/>
-              <a:t>10/7/2017</a:t>
+              <a:t>10/11/2017</a:t>
             </a:fld>
             <a:endParaRPr lang="en-US"/>
           </a:p>
@@ -1729,7 +1727,7 @@
           <a:p>
             <a:fld id="{0FFA1DB2-F186-40A4-8E7C-447CEF618330}" type="datetimeFigureOut">
               <a:rPr lang="en-US" smtClean="0"/>
-              <a:t>10/7/2017</a:t>
+              <a:t>10/11/2017</a:t>
             </a:fld>
             <a:endParaRPr lang="en-US"/>
           </a:p>
@@ -2096,7 +2094,7 @@
           <a:p>
             <a:fld id="{0FFA1DB2-F186-40A4-8E7C-447CEF618330}" type="datetimeFigureOut">
               <a:rPr lang="en-US" smtClean="0"/>
-              <a:t>10/7/2017</a:t>
+              <a:t>10/11/2017</a:t>
             </a:fld>
             <a:endParaRPr lang="en-US"/>
           </a:p>
@@ -2214,7 +2212,7 @@
           <a:p>
             <a:fld id="{0FFA1DB2-F186-40A4-8E7C-447CEF618330}" type="datetimeFigureOut">
               <a:rPr lang="en-US" smtClean="0"/>
-              <a:t>10/7/2017</a:t>
+              <a:t>10/11/2017</a:t>
             </a:fld>
             <a:endParaRPr lang="en-US"/>
           </a:p>
@@ -2309,7 +2307,7 @@
           <a:p>
             <a:fld id="{0FFA1DB2-F186-40A4-8E7C-447CEF618330}" type="datetimeFigureOut">
               <a:rPr lang="en-US" smtClean="0"/>
-              <a:t>10/7/2017</a:t>
+              <a:t>10/11/2017</a:t>
             </a:fld>
             <a:endParaRPr lang="en-US"/>
           </a:p>
@@ -2586,7 +2584,7 @@
           <a:p>
             <a:fld id="{0FFA1DB2-F186-40A4-8E7C-447CEF618330}" type="datetimeFigureOut">
               <a:rPr lang="en-US" smtClean="0"/>
-              <a:t>10/7/2017</a:t>
+              <a:t>10/11/2017</a:t>
             </a:fld>
             <a:endParaRPr lang="en-US"/>
           </a:p>
@@ -2839,7 +2837,7 @@
           <a:p>
             <a:fld id="{0FFA1DB2-F186-40A4-8E7C-447CEF618330}" type="datetimeFigureOut">
               <a:rPr lang="en-US" smtClean="0"/>
-              <a:t>10/7/2017</a:t>
+              <a:t>10/11/2017</a:t>
             </a:fld>
             <a:endParaRPr lang="en-US"/>
           </a:p>
@@ -3052,7 +3050,7 @@
           <a:p>
             <a:fld id="{0FFA1DB2-F186-40A4-8E7C-447CEF618330}" type="datetimeFigureOut">
               <a:rPr lang="en-US" smtClean="0"/>
-              <a:t>10/7/2017</a:t>
+              <a:t>10/11/2017</a:t>
             </a:fld>
             <a:endParaRPr lang="en-US"/>
           </a:p>
@@ -3509,6 +3507,13 @@
   <p:clrMapOvr>
     <a:masterClrMapping/>
   </p:clrMapOvr>
+  <p:timing>
+    <p:tnLst>
+      <p:par>
+        <p:cTn id="1" dur="indefinite" restart="never" nodeType="tmRoot"/>
+      </p:par>
+    </p:tnLst>
+  </p:timing>
 </p:sld>
 </file>
 
@@ -3546,8 +3551,9 @@
           <a:p>
             <a:r>
               <a:rPr lang="en-US" dirty="0"/>
-              <a:t>PAPR distribution (CCDF)</a:t>
-            </a:r>
+              <a:t>PAPR distribution (CCDF): analytic expression [1]</a:t>
+            </a:r>
+            <a:endParaRPr lang="en-US" dirty="0"/>
           </a:p>
         </p:txBody>
       </p:sp>
@@ -3631,7 +3637,7 @@
           <a:graphicData uri="http://schemas.openxmlformats.org/presentationml/2006/ole">
             <mc:AlternateContent xmlns:mc="http://schemas.openxmlformats.org/markup-compatibility/2006">
               <mc:Choice xmlns:v="urn:schemas-microsoft-com:vml" Requires="v">
-                <p:oleObj spid="_x0000_s3210" name="Equation" r:id="rId3" imgW="4178160" imgH="1396800" progId="Equation.DSMT4">
+                <p:oleObj spid="_x0000_s3252" name="Equation" r:id="rId3" imgW="4178160" imgH="1396800" progId="Equation.DSMT4">
                   <p:embed/>
                 </p:oleObj>
               </mc:Choice>
@@ -3688,7 +3694,7 @@
           <a:graphicData uri="http://schemas.openxmlformats.org/presentationml/2006/ole">
             <mc:AlternateContent xmlns:mc="http://schemas.openxmlformats.org/markup-compatibility/2006">
               <mc:Choice xmlns:v="urn:schemas-microsoft-com:vml" Requires="v">
-                <p:oleObj spid="_x0000_s3211" name="Equation" r:id="rId5" imgW="850680" imgH="419040" progId="Equation.DSMT4">
+                <p:oleObj spid="_x0000_s3253" name="Equation" r:id="rId5" imgW="850680" imgH="419040" progId="Equation.DSMT4">
                   <p:embed/>
                 </p:oleObj>
               </mc:Choice>
@@ -3745,7 +3751,7 @@
           <a:graphicData uri="http://schemas.openxmlformats.org/presentationml/2006/ole">
             <mc:AlternateContent xmlns:mc="http://schemas.openxmlformats.org/markup-compatibility/2006">
               <mc:Choice xmlns:v="urn:schemas-microsoft-com:vml" Requires="v">
-                <p:oleObj spid="_x0000_s3212" name="Equation" r:id="rId7" imgW="2844720" imgH="482400" progId="Equation.DSMT4">
+                <p:oleObj spid="_x0000_s3254" name="Equation" r:id="rId7" imgW="2844720" imgH="482400" progId="Equation.DSMT4">
                   <p:embed/>
                 </p:oleObj>
               </mc:Choice>
@@ -3838,7 +3844,11 @@
             </a:r>
             <a:r>
               <a:rPr lang="en-US" dirty="0" smtClean="0"/>
-              <a:t>) [1]</a:t>
+              <a:t>): analytic expression </a:t>
+            </a:r>
+            <a:r>
+              <a:rPr lang="en-US" dirty="0" smtClean="0"/>
+              <a:t>[1]</a:t>
             </a:r>
             <a:endParaRPr lang="en-US" dirty="0"/>
           </a:p>
@@ -3890,8 +3900,8 @@
         </p:blipFill>
         <p:spPr>
           <a:xfrm>
-            <a:off x="1951630" y="2060020"/>
-            <a:ext cx="7206018" cy="4659958"/>
+            <a:off x="1295400" y="1875354"/>
+            <a:ext cx="9375728" cy="4659958"/>
           </a:xfrm>
           <a:prstGeom prst="rect">
             <a:avLst/>
@@ -3908,6 +3918,13 @@
   <p:clrMapOvr>
     <a:masterClrMapping/>
   </p:clrMapOvr>
+  <p:timing>
+    <p:tnLst>
+      <p:par>
+        <p:cTn id="1" dur="indefinite" restart="never" nodeType="tmRoot"/>
+      </p:par>
+    </p:tnLst>
+  </p:timing>
 </p:sld>
 </file>
 
@@ -4043,6 +4060,13 @@
   <p:clrMapOvr>
     <a:masterClrMapping/>
   </p:clrMapOvr>
+  <p:timing>
+    <p:tnLst>
+      <p:par>
+        <p:cTn id="1" dur="indefinite" restart="never" nodeType="tmRoot"/>
+      </p:par>
+    </p:tnLst>
+  </p:timing>
 </p:sld>
 </file>
 
@@ -4153,6 +4177,13 @@
   <p:clrMapOvr>
     <a:masterClrMapping/>
   </p:clrMapOvr>
+  <p:timing>
+    <p:tnLst>
+      <p:par>
+        <p:cTn id="1" dur="indefinite" restart="never" nodeType="tmRoot"/>
+      </p:par>
+    </p:tnLst>
+  </p:timing>
 </p:sld>
 </file>
 
@@ -4180,7 +4211,7 @@
             <a:spLocks noGrp="1"/>
           </p:cNvSpPr>
           <p:nvPr>
-            <p:ph type="title"/>
+            <p:ph type="ctrTitle"/>
           </p:nvPr>
         </p:nvSpPr>
         <p:spPr/>
@@ -4189,21 +4220,24 @@
           <a:lstStyle/>
           <a:p>
             <a:r>
-              <a:rPr lang="en-US" dirty="0" smtClean="0"/>
-              <a:t>PAPR dependencies</a:t>
-            </a:r>
+              <a:rPr lang="en-US" dirty="0"/>
+              <a:t>PAPR reduction techniques</a:t>
+            </a:r>
+            <a:br>
+              <a:rPr lang="en-US" dirty="0"/>
+            </a:br>
             <a:endParaRPr lang="en-US" dirty="0"/>
           </a:p>
         </p:txBody>
       </p:sp>
       <p:sp>
         <p:nvSpPr>
-          <p:cNvPr id="3" name="Content Placeholder 2"/>
-          <p:cNvSpPr>
-            <a:spLocks noGrp="1"/>
-          </p:cNvSpPr>
-          <p:nvPr>
-            <p:ph idx="1"/>
+          <p:cNvPr id="3" name="Subtitle 2"/>
+          <p:cNvSpPr>
+            <a:spLocks noGrp="1"/>
+          </p:cNvSpPr>
+          <p:nvPr>
+            <p:ph type="subTitle" idx="1"/>
           </p:nvPr>
         </p:nvSpPr>
         <p:spPr/>
@@ -4211,42 +4245,27 @@
           <a:bodyPr/>
           <a:lstStyle/>
           <a:p>
-            <a:r>
-              <a:rPr lang="en-US" dirty="0" smtClean="0"/>
-              <a:t>Modulation</a:t>
-            </a:r>
-          </a:p>
-          <a:p>
-            <a:r>
-              <a:rPr lang="en-US" dirty="0" smtClean="0"/>
-              <a:t>Number of carriers</a:t>
-            </a:r>
-          </a:p>
-          <a:p>
-            <a:r>
-              <a:rPr lang="en-US" dirty="0" smtClean="0"/>
-              <a:t>Sampling rate?</a:t>
-            </a:r>
-          </a:p>
-          <a:p>
-            <a:r>
-              <a:rPr lang="en-US" dirty="0" smtClean="0"/>
-              <a:t>Interpolation to approach the analog signal</a:t>
-            </a:r>
-            <a:endParaRPr lang="en-US" dirty="0"/>
+            <a:endParaRPr lang="en-US"/>
           </a:p>
         </p:txBody>
       </p:sp>
     </p:spTree>
     <p:extLst>
       <p:ext uri="{BB962C8B-B14F-4D97-AF65-F5344CB8AC3E}">
-        <p14:creationId xmlns:p14="http://schemas.microsoft.com/office/powerpoint/2010/main" val="335503382"/>
+        <p14:creationId xmlns:p14="http://schemas.microsoft.com/office/powerpoint/2010/main" val="2243095156"/>
       </p:ext>
     </p:extLst>
   </p:cSld>
   <p:clrMapOvr>
     <a:masterClrMapping/>
   </p:clrMapOvr>
+  <p:timing>
+    <p:tnLst>
+      <p:par>
+        <p:cTn id="1" dur="indefinite" restart="never" nodeType="tmRoot"/>
+      </p:par>
+    </p:tnLst>
+  </p:timing>
 </p:sld>
 </file>
 
@@ -4274,7 +4293,7 @@
             <a:spLocks noGrp="1"/>
           </p:cNvSpPr>
           <p:nvPr>
-            <p:ph type="ctrTitle"/>
+            <p:ph type="title"/>
           </p:nvPr>
         </p:nvSpPr>
         <p:spPr/>
@@ -4283,24 +4302,21 @@
           <a:lstStyle/>
           <a:p>
             <a:r>
-              <a:rPr lang="en-US" dirty="0"/>
-              <a:t>PAPR reduction techniques</a:t>
-            </a:r>
-            <a:br>
-              <a:rPr lang="en-US" dirty="0"/>
-            </a:br>
+              <a:rPr lang="en-US" dirty="0" smtClean="0"/>
+              <a:t>Criteria</a:t>
+            </a:r>
             <a:endParaRPr lang="en-US" dirty="0"/>
           </a:p>
         </p:txBody>
       </p:sp>
       <p:sp>
         <p:nvSpPr>
-          <p:cNvPr id="3" name="Subtitle 2"/>
-          <p:cNvSpPr>
-            <a:spLocks noGrp="1"/>
-          </p:cNvSpPr>
-          <p:nvPr>
-            <p:ph type="subTitle" idx="1"/>
+          <p:cNvPr id="3" name="Content Placeholder 2"/>
+          <p:cNvSpPr>
+            <a:spLocks noGrp="1"/>
+          </p:cNvSpPr>
+          <p:nvPr>
+            <p:ph idx="1"/>
           </p:nvPr>
         </p:nvSpPr>
         <p:spPr/>
@@ -4308,20 +4324,66 @@
           <a:bodyPr/>
           <a:lstStyle/>
           <a:p>
-            <a:endParaRPr lang="en-US"/>
+            <a:r>
+              <a:rPr lang="en-US" dirty="0" smtClean="0"/>
+              <a:t>PAPR reduction</a:t>
+            </a:r>
+          </a:p>
+          <a:p>
+            <a:r>
+              <a:rPr lang="en-US" dirty="0" smtClean="0"/>
+              <a:t>BER performance</a:t>
+            </a:r>
+          </a:p>
+          <a:p>
+            <a:r>
+              <a:rPr lang="en-US" dirty="0" smtClean="0"/>
+              <a:t>Average power conservation</a:t>
+            </a:r>
+          </a:p>
+          <a:p>
+            <a:r>
+              <a:rPr lang="en-US" dirty="0" smtClean="0"/>
+              <a:t>Data Rate </a:t>
+            </a:r>
+          </a:p>
+          <a:p>
+            <a:r>
+              <a:rPr lang="en-US" dirty="0" smtClean="0"/>
+              <a:t>Spectral spillage</a:t>
+            </a:r>
+          </a:p>
+          <a:p>
+            <a:r>
+              <a:rPr lang="en-US" dirty="0" smtClean="0"/>
+              <a:t>Complexity</a:t>
+            </a:r>
+          </a:p>
+          <a:p>
+            <a:endParaRPr lang="en-US" dirty="0" smtClean="0"/>
+          </a:p>
+          <a:p>
+            <a:endParaRPr lang="en-US" dirty="0"/>
           </a:p>
         </p:txBody>
       </p:sp>
     </p:spTree>
     <p:extLst>
       <p:ext uri="{BB962C8B-B14F-4D97-AF65-F5344CB8AC3E}">
-        <p14:creationId xmlns:p14="http://schemas.microsoft.com/office/powerpoint/2010/main" val="2243095156"/>
+        <p14:creationId xmlns:p14="http://schemas.microsoft.com/office/powerpoint/2010/main" val="413816367"/>
       </p:ext>
     </p:extLst>
   </p:cSld>
   <p:clrMapOvr>
     <a:masterClrMapping/>
   </p:clrMapOvr>
+  <p:timing>
+    <p:tnLst>
+      <p:par>
+        <p:cTn id="1" dur="indefinite" restart="never" nodeType="tmRoot"/>
+      </p:par>
+    </p:tnLst>
+  </p:timing>
 </p:sld>
 </file>
 
@@ -4359,117 +4421,6 @@
           <a:p>
             <a:r>
               <a:rPr lang="en-US" dirty="0" smtClean="0"/>
-              <a:t>Criteria</a:t>
-            </a:r>
-            <a:endParaRPr lang="en-US" dirty="0"/>
-          </a:p>
-        </p:txBody>
-      </p:sp>
-      <p:sp>
-        <p:nvSpPr>
-          <p:cNvPr id="3" name="Content Placeholder 2"/>
-          <p:cNvSpPr>
-            <a:spLocks noGrp="1"/>
-          </p:cNvSpPr>
-          <p:nvPr>
-            <p:ph idx="1"/>
-          </p:nvPr>
-        </p:nvSpPr>
-        <p:spPr/>
-        <p:txBody>
-          <a:bodyPr/>
-          <a:lstStyle/>
-          <a:p>
-            <a:r>
-              <a:rPr lang="en-US" dirty="0" smtClean="0"/>
-              <a:t>PAPR reduction</a:t>
-            </a:r>
-          </a:p>
-          <a:p>
-            <a:r>
-              <a:rPr lang="en-US" dirty="0" smtClean="0"/>
-              <a:t>BER performance</a:t>
-            </a:r>
-          </a:p>
-          <a:p>
-            <a:r>
-              <a:rPr lang="en-US" dirty="0" smtClean="0"/>
-              <a:t>Average power conservation</a:t>
-            </a:r>
-          </a:p>
-          <a:p>
-            <a:r>
-              <a:rPr lang="en-US" dirty="0" smtClean="0"/>
-              <a:t>Data Rate </a:t>
-            </a:r>
-          </a:p>
-          <a:p>
-            <a:r>
-              <a:rPr lang="en-US" dirty="0" smtClean="0"/>
-              <a:t>Spectral spillage</a:t>
-            </a:r>
-          </a:p>
-          <a:p>
-            <a:r>
-              <a:rPr lang="en-US" dirty="0" smtClean="0"/>
-              <a:t>Complexity</a:t>
-            </a:r>
-          </a:p>
-          <a:p>
-            <a:endParaRPr lang="en-US" dirty="0" smtClean="0"/>
-          </a:p>
-          <a:p>
-            <a:endParaRPr lang="en-US" dirty="0"/>
-          </a:p>
-        </p:txBody>
-      </p:sp>
-    </p:spTree>
-    <p:extLst>
-      <p:ext uri="{BB962C8B-B14F-4D97-AF65-F5344CB8AC3E}">
-        <p14:creationId xmlns:p14="http://schemas.microsoft.com/office/powerpoint/2010/main" val="413816367"/>
-      </p:ext>
-    </p:extLst>
-  </p:cSld>
-  <p:clrMapOvr>
-    <a:masterClrMapping/>
-  </p:clrMapOvr>
-</p:sld>
-</file>
-
-<file path=ppt/slides/slide17.xml><?xml version="1.0" encoding="utf-8"?>
-<p:sld xmlns:a="http://schemas.openxmlformats.org/drawingml/2006/main" xmlns:r="http://schemas.openxmlformats.org/officeDocument/2006/relationships" xmlns:p="http://schemas.openxmlformats.org/presentationml/2006/main">
-  <p:cSld>
-    <p:spTree>
-      <p:nvGrpSpPr>
-        <p:cNvPr id="1" name=""/>
-        <p:cNvGrpSpPr/>
-        <p:nvPr/>
-      </p:nvGrpSpPr>
-      <p:grpSpPr>
-        <a:xfrm>
-          <a:off x="0" y="0"/>
-          <a:ext cx="0" cy="0"/>
-          <a:chOff x="0" y="0"/>
-          <a:chExt cx="0" cy="0"/>
-        </a:xfrm>
-      </p:grpSpPr>
-      <p:sp>
-        <p:nvSpPr>
-          <p:cNvPr id="2" name="Title 1"/>
-          <p:cNvSpPr>
-            <a:spLocks noGrp="1"/>
-          </p:cNvSpPr>
-          <p:nvPr>
-            <p:ph type="title"/>
-          </p:nvPr>
-        </p:nvSpPr>
-        <p:spPr/>
-        <p:txBody>
-          <a:bodyPr/>
-          <a:lstStyle/>
-          <a:p>
-            <a:r>
-              <a:rPr lang="en-US" dirty="0" smtClean="0"/>
               <a:t>Techniques comparison</a:t>
             </a:r>
             <a:endParaRPr lang="en-US" dirty="0"/>
@@ -4485,7 +4436,7 @@
           <p:nvPr>
             <p:extLst>
               <p:ext uri="{D42A27DB-BD31-4B8C-83A1-F6EECF244321}">
-                <p14:modId xmlns:p14="http://schemas.microsoft.com/office/powerpoint/2010/main" val="1695037406"/>
+                <p14:modId xmlns:p14="http://schemas.microsoft.com/office/powerpoint/2010/main" val="2184686717"/>
               </p:ext>
             </p:extLst>
           </p:nvPr>
@@ -4854,10 +4805,10 @@
                     <a:p>
                       <a:pPr algn="l" fontAlgn="b"/>
                       <a:r>
-                        <a:rPr lang="en-US" sz="1400" b="1" i="1" u="none" strike="noStrike" dirty="0">
+                        <a:rPr lang="en-US" sz="1400" b="1" i="1" u="none" strike="noStrike" dirty="0" smtClean="0">
                           <a:effectLst/>
                         </a:rPr>
-                        <a:t>Coding</a:t>
+                        <a:t>Coding[3]</a:t>
                       </a:r>
                       <a:endParaRPr lang="en-US" sz="1400" b="1" i="1" u="none" strike="noStrike" dirty="0">
                         <a:solidFill>
@@ -5017,10 +4968,16 @@
                     <a:p>
                       <a:pPr algn="l" fontAlgn="b"/>
                       <a:r>
-                        <a:rPr lang="en-US" sz="1400" b="1" i="1" u="none" strike="noStrike" dirty="0" err="1">
+                        <a:rPr lang="en-US" sz="1400" b="1" i="1" u="none" strike="noStrike" dirty="0" err="1" smtClean="0">
                           <a:effectLst/>
                         </a:rPr>
                         <a:t>Companding</a:t>
+                      </a:r>
+                      <a:r>
+                        <a:rPr lang="en-US" sz="1400" b="1" i="1" u="none" strike="noStrike" dirty="0" smtClean="0">
+                          <a:effectLst/>
+                        </a:rPr>
+                        <a:t> [5]</a:t>
                       </a:r>
                       <a:endParaRPr lang="en-US" sz="1400" b="1" i="1" u="none" strike="noStrike" dirty="0">
                         <a:solidFill>
@@ -5512,10 +5469,17 @@
   <p:clrMapOvr>
     <a:masterClrMapping/>
   </p:clrMapOvr>
+  <p:timing>
+    <p:tnLst>
+      <p:par>
+        <p:cTn id="1" dur="indefinite" restart="never" nodeType="tmRoot"/>
+      </p:par>
+    </p:tnLst>
+  </p:timing>
 </p:sld>
 </file>
 
-<file path=ppt/slides/slide18.xml><?xml version="1.0" encoding="utf-8"?>
+<file path=ppt/slides/slide17.xml><?xml version="1.0" encoding="utf-8"?>
 <p:sld xmlns:a="http://schemas.openxmlformats.org/drawingml/2006/main" xmlns:r="http://schemas.openxmlformats.org/officeDocument/2006/relationships" xmlns:p="http://schemas.openxmlformats.org/presentationml/2006/main">
   <p:cSld>
     <p:spTree>
@@ -5712,10 +5676,17 @@
   <p:clrMapOvr>
     <a:masterClrMapping/>
   </p:clrMapOvr>
+  <p:timing>
+    <p:tnLst>
+      <p:par>
+        <p:cTn id="1" dur="indefinite" restart="never" nodeType="tmRoot"/>
+      </p:par>
+    </p:tnLst>
+  </p:timing>
 </p:sld>
 </file>
 
-<file path=ppt/slides/slide19.xml><?xml version="1.0" encoding="utf-8"?>
+<file path=ppt/slides/slide18.xml><?xml version="1.0" encoding="utf-8"?>
 <p:sld xmlns:a="http://schemas.openxmlformats.org/drawingml/2006/main" xmlns:r="http://schemas.openxmlformats.org/officeDocument/2006/relationships" xmlns:p="http://schemas.openxmlformats.org/presentationml/2006/main">
   <p:cSld>
     <p:spTree>
@@ -5784,116 +5755,17 @@
   <p:clrMapOvr>
     <a:masterClrMapping/>
   </p:clrMapOvr>
+  <p:timing>
+    <p:tnLst>
+      <p:par>
+        <p:cTn id="1" dur="indefinite" restart="never" nodeType="tmRoot"/>
+      </p:par>
+    </p:tnLst>
+  </p:timing>
 </p:sld>
 </file>
 
-<file path=ppt/slides/slide2.xml><?xml version="1.0" encoding="utf-8"?>
-<p:sld xmlns:a="http://schemas.openxmlformats.org/drawingml/2006/main" xmlns:r="http://schemas.openxmlformats.org/officeDocument/2006/relationships" xmlns:p="http://schemas.openxmlformats.org/presentationml/2006/main">
-  <p:cSld>
-    <p:spTree>
-      <p:nvGrpSpPr>
-        <p:cNvPr id="1" name=""/>
-        <p:cNvGrpSpPr/>
-        <p:nvPr/>
-      </p:nvGrpSpPr>
-      <p:grpSpPr>
-        <a:xfrm>
-          <a:off x="0" y="0"/>
-          <a:ext cx="0" cy="0"/>
-          <a:chOff x="0" y="0"/>
-          <a:chExt cx="0" cy="0"/>
-        </a:xfrm>
-      </p:grpSpPr>
-      <p:sp>
-        <p:nvSpPr>
-          <p:cNvPr id="2" name="Title 1"/>
-          <p:cNvSpPr>
-            <a:spLocks noGrp="1"/>
-          </p:cNvSpPr>
-          <p:nvPr>
-            <p:ph type="title"/>
-          </p:nvPr>
-        </p:nvSpPr>
-        <p:spPr/>
-        <p:txBody>
-          <a:bodyPr/>
-          <a:lstStyle/>
-          <a:p>
-            <a:r>
-              <a:rPr lang="en-US" dirty="0" smtClean="0"/>
-              <a:t>Table of contents</a:t>
-            </a:r>
-            <a:endParaRPr lang="en-US" dirty="0"/>
-          </a:p>
-        </p:txBody>
-      </p:sp>
-      <p:sp>
-        <p:nvSpPr>
-          <p:cNvPr id="3" name="Content Placeholder 2"/>
-          <p:cNvSpPr>
-            <a:spLocks noGrp="1"/>
-          </p:cNvSpPr>
-          <p:nvPr>
-            <p:ph idx="1"/>
-          </p:nvPr>
-        </p:nvSpPr>
-        <p:spPr/>
-        <p:txBody>
-          <a:bodyPr/>
-          <a:lstStyle/>
-          <a:p>
-            <a:r>
-              <a:rPr lang="en-US" dirty="0" smtClean="0"/>
-              <a:t>The PAPR problem in OFDM</a:t>
-            </a:r>
-          </a:p>
-          <a:p>
-            <a:r>
-              <a:rPr lang="en-US" dirty="0" smtClean="0"/>
-              <a:t>Theory</a:t>
-            </a:r>
-          </a:p>
-          <a:p>
-            <a:r>
-              <a:rPr lang="en-US" dirty="0" smtClean="0"/>
-              <a:t>PAPR reduction techniques</a:t>
-            </a:r>
-          </a:p>
-          <a:p>
-            <a:r>
-              <a:rPr lang="en-US" dirty="0" smtClean="0"/>
-              <a:t>The PTS technique</a:t>
-            </a:r>
-          </a:p>
-          <a:p>
-            <a:r>
-              <a:rPr lang="en-US" dirty="0" smtClean="0"/>
-              <a:t>PTS simulations</a:t>
-            </a:r>
-          </a:p>
-          <a:p>
-            <a:r>
-              <a:rPr lang="en-US" dirty="0" smtClean="0"/>
-              <a:t>Incorporation into the OFDM modem</a:t>
-            </a:r>
-            <a:endParaRPr lang="en-US" dirty="0"/>
-          </a:p>
-        </p:txBody>
-      </p:sp>
-    </p:spTree>
-    <p:extLst>
-      <p:ext uri="{BB962C8B-B14F-4D97-AF65-F5344CB8AC3E}">
-        <p14:creationId xmlns:p14="http://schemas.microsoft.com/office/powerpoint/2010/main" val="1968100318"/>
-      </p:ext>
-    </p:extLst>
-  </p:cSld>
-  <p:clrMapOvr>
-    <a:masterClrMapping/>
-  </p:clrMapOvr>
-</p:sld>
-</file>
-
-<file path=ppt/slides/slide20.xml><?xml version="1.0" encoding="utf-8"?>
+<file path=ppt/slides/slide19.xml><?xml version="1.0" encoding="utf-8"?>
 <p:sld xmlns:a="http://schemas.openxmlformats.org/drawingml/2006/main" xmlns:r="http://schemas.openxmlformats.org/officeDocument/2006/relationships" xmlns:p="http://schemas.openxmlformats.org/presentationml/2006/main">
   <p:cSld>
     <p:spTree>
@@ -5967,6 +5839,323 @@
   <p:clrMapOvr>
     <a:masterClrMapping/>
   </p:clrMapOvr>
+  <p:timing>
+    <p:tnLst>
+      <p:par>
+        <p:cTn id="1" dur="indefinite" restart="never" nodeType="tmRoot"/>
+      </p:par>
+    </p:tnLst>
+  </p:timing>
+</p:sld>
+</file>
+
+<file path=ppt/slides/slide2.xml><?xml version="1.0" encoding="utf-8"?>
+<p:sld xmlns:a="http://schemas.openxmlformats.org/drawingml/2006/main" xmlns:r="http://schemas.openxmlformats.org/officeDocument/2006/relationships" xmlns:p="http://schemas.openxmlformats.org/presentationml/2006/main">
+  <p:cSld>
+    <p:spTree>
+      <p:nvGrpSpPr>
+        <p:cNvPr id="1" name=""/>
+        <p:cNvGrpSpPr/>
+        <p:nvPr/>
+      </p:nvGrpSpPr>
+      <p:grpSpPr>
+        <a:xfrm>
+          <a:off x="0" y="0"/>
+          <a:ext cx="0" cy="0"/>
+          <a:chOff x="0" y="0"/>
+          <a:chExt cx="0" cy="0"/>
+        </a:xfrm>
+      </p:grpSpPr>
+      <p:sp>
+        <p:nvSpPr>
+          <p:cNvPr id="2" name="Title 1"/>
+          <p:cNvSpPr>
+            <a:spLocks noGrp="1"/>
+          </p:cNvSpPr>
+          <p:nvPr>
+            <p:ph type="title"/>
+          </p:nvPr>
+        </p:nvSpPr>
+        <p:spPr/>
+        <p:txBody>
+          <a:bodyPr/>
+          <a:lstStyle/>
+          <a:p>
+            <a:r>
+              <a:rPr lang="en-US" dirty="0" smtClean="0"/>
+              <a:t>Table of contents</a:t>
+            </a:r>
+            <a:endParaRPr lang="en-US" dirty="0"/>
+          </a:p>
+        </p:txBody>
+      </p:sp>
+      <p:sp>
+        <p:nvSpPr>
+          <p:cNvPr id="3" name="Content Placeholder 2"/>
+          <p:cNvSpPr>
+            <a:spLocks noGrp="1"/>
+          </p:cNvSpPr>
+          <p:nvPr>
+            <p:ph idx="1"/>
+          </p:nvPr>
+        </p:nvSpPr>
+        <p:spPr/>
+        <p:txBody>
+          <a:bodyPr/>
+          <a:lstStyle/>
+          <a:p>
+            <a:r>
+              <a:rPr lang="en-US" dirty="0" smtClean="0"/>
+              <a:t>The PAPR problem in OFDM</a:t>
+            </a:r>
+          </a:p>
+          <a:p>
+            <a:r>
+              <a:rPr lang="en-US" dirty="0" smtClean="0"/>
+              <a:t>Theory</a:t>
+            </a:r>
+          </a:p>
+          <a:p>
+            <a:r>
+              <a:rPr lang="en-US" dirty="0" smtClean="0"/>
+              <a:t>PAPR reduction techniques</a:t>
+            </a:r>
+          </a:p>
+          <a:p>
+            <a:r>
+              <a:rPr lang="en-US" dirty="0" smtClean="0"/>
+              <a:t>The PTS technique</a:t>
+            </a:r>
+          </a:p>
+          <a:p>
+            <a:r>
+              <a:rPr lang="en-US" dirty="0" smtClean="0"/>
+              <a:t>PTS simulations</a:t>
+            </a:r>
+          </a:p>
+          <a:p>
+            <a:r>
+              <a:rPr lang="en-US" dirty="0" smtClean="0"/>
+              <a:t>Incorporation into the OFDM modem</a:t>
+            </a:r>
+            <a:endParaRPr lang="en-US" dirty="0"/>
+          </a:p>
+        </p:txBody>
+      </p:sp>
+    </p:spTree>
+    <p:extLst>
+      <p:ext uri="{BB962C8B-B14F-4D97-AF65-F5344CB8AC3E}">
+        <p14:creationId xmlns:p14="http://schemas.microsoft.com/office/powerpoint/2010/main" val="1968100318"/>
+      </p:ext>
+    </p:extLst>
+  </p:cSld>
+  <p:clrMapOvr>
+    <a:masterClrMapping/>
+  </p:clrMapOvr>
+  <p:timing>
+    <p:tnLst>
+      <p:par>
+        <p:cTn id="1" dur="indefinite" restart="never" nodeType="tmRoot"/>
+      </p:par>
+    </p:tnLst>
+  </p:timing>
+</p:sld>
+</file>
+
+<file path=ppt/slides/slide20.xml><?xml version="1.0" encoding="utf-8"?>
+<p:sld xmlns:a="http://schemas.openxmlformats.org/drawingml/2006/main" xmlns:r="http://schemas.openxmlformats.org/officeDocument/2006/relationships" xmlns:p="http://schemas.openxmlformats.org/presentationml/2006/main">
+  <p:cSld>
+    <p:spTree>
+      <p:nvGrpSpPr>
+        <p:cNvPr id="1" name=""/>
+        <p:cNvGrpSpPr/>
+        <p:nvPr/>
+      </p:nvGrpSpPr>
+      <p:grpSpPr>
+        <a:xfrm>
+          <a:off x="0" y="0"/>
+          <a:ext cx="0" cy="0"/>
+          <a:chOff x="0" y="0"/>
+          <a:chExt cx="0" cy="0"/>
+        </a:xfrm>
+      </p:grpSpPr>
+      <p:sp>
+        <p:nvSpPr>
+          <p:cNvPr id="2" name="Title 1"/>
+          <p:cNvSpPr>
+            <a:spLocks noGrp="1"/>
+          </p:cNvSpPr>
+          <p:nvPr>
+            <p:ph type="title"/>
+          </p:nvPr>
+        </p:nvSpPr>
+        <p:spPr/>
+        <p:txBody>
+          <a:bodyPr/>
+          <a:lstStyle/>
+          <a:p>
+            <a:r>
+              <a:rPr lang="en-US" dirty="0" smtClean="0"/>
+              <a:t>Algorithm steps</a:t>
+            </a:r>
+            <a:endParaRPr lang="en-US" dirty="0"/>
+          </a:p>
+        </p:txBody>
+      </p:sp>
+      <p:sp>
+        <p:nvSpPr>
+          <p:cNvPr id="3" name="Content Placeholder 2"/>
+          <p:cNvSpPr>
+            <a:spLocks noGrp="1"/>
+          </p:cNvSpPr>
+          <p:nvPr>
+            <p:ph idx="1"/>
+          </p:nvPr>
+        </p:nvSpPr>
+        <p:spPr/>
+        <p:txBody>
+          <a:bodyPr>
+            <a:normAutofit lnSpcReduction="10000"/>
+          </a:bodyPr>
+          <a:lstStyle/>
+          <a:p>
+            <a:pPr marL="514350" indent="-514350">
+              <a:buFont typeface="+mj-lt"/>
+              <a:buAutoNum type="arabicPeriod"/>
+            </a:pPr>
+            <a:r>
+              <a:rPr lang="en-US" dirty="0" smtClean="0"/>
+              <a:t>Division of the N-long OFDM symbol into M sub-blocks:</a:t>
+            </a:r>
+          </a:p>
+          <a:p>
+            <a:pPr marL="971550" lvl="1" indent="-514350">
+              <a:buFont typeface="+mj-lt"/>
+              <a:buAutoNum type="arabicPeriod"/>
+            </a:pPr>
+            <a:r>
+              <a:rPr lang="en-US" dirty="0" smtClean="0"/>
+              <a:t>Contiguous</a:t>
+            </a:r>
+          </a:p>
+          <a:p>
+            <a:pPr marL="971550" lvl="1" indent="-514350">
+              <a:buFont typeface="+mj-lt"/>
+              <a:buAutoNum type="arabicPeriod"/>
+            </a:pPr>
+            <a:r>
+              <a:rPr lang="en-US" dirty="0" err="1"/>
+              <a:t>P</a:t>
+            </a:r>
+            <a:r>
+              <a:rPr lang="en-US" dirty="0" err="1" smtClean="0"/>
+              <a:t>olyphase</a:t>
+            </a:r>
+            <a:endParaRPr lang="en-US" dirty="0" smtClean="0"/>
+          </a:p>
+          <a:p>
+            <a:pPr marL="514350" indent="-514350">
+              <a:buFont typeface="+mj-lt"/>
+              <a:buAutoNum type="arabicPeriod"/>
+            </a:pPr>
+            <a:r>
+              <a:rPr lang="en-US" dirty="0" smtClean="0"/>
+              <a:t>Zero padding of each of the sub-blocks to length of N</a:t>
+            </a:r>
+          </a:p>
+          <a:p>
+            <a:pPr marL="514350" indent="-514350">
+              <a:buFont typeface="+mj-lt"/>
+              <a:buAutoNum type="arabicPeriod"/>
+            </a:pPr>
+            <a:r>
+              <a:rPr lang="en-US" dirty="0" smtClean="0"/>
+              <a:t>IDFT over each of the sub-blocks</a:t>
+            </a:r>
+          </a:p>
+          <a:p>
+            <a:pPr marL="514350" indent="-514350">
+              <a:buFont typeface="+mj-lt"/>
+              <a:buAutoNum type="arabicPeriod"/>
+            </a:pPr>
+            <a:r>
+              <a:rPr lang="en-US" dirty="0" smtClean="0"/>
+              <a:t>Calculation of optimum PTS coefficients vector:</a:t>
+            </a:r>
+          </a:p>
+          <a:p>
+            <a:pPr marL="971550" lvl="1" indent="-514350">
+              <a:buFont typeface="+mj-lt"/>
+              <a:buAutoNum type="arabicPeriod"/>
+            </a:pPr>
+            <a:r>
+              <a:rPr lang="en-US" dirty="0" smtClean="0"/>
+              <a:t>Iterative flipping</a:t>
+            </a:r>
+          </a:p>
+          <a:p>
+            <a:pPr marL="971550" lvl="1" indent="-514350">
+              <a:buFont typeface="+mj-lt"/>
+              <a:buAutoNum type="arabicPeriod"/>
+            </a:pPr>
+            <a:r>
+              <a:rPr lang="en-US" dirty="0" smtClean="0"/>
+              <a:t>Reduced complexity</a:t>
+            </a:r>
+          </a:p>
+          <a:p>
+            <a:pPr marL="514350" indent="-514350">
+              <a:buFont typeface="+mj-lt"/>
+              <a:buAutoNum type="arabicPeriod"/>
+            </a:pPr>
+            <a:r>
+              <a:rPr lang="en-US" dirty="0" smtClean="0"/>
+              <a:t>Multiplication of the sub-blocks by the PTS coefficients</a:t>
+            </a:r>
+          </a:p>
+          <a:p>
+            <a:pPr marL="514350" indent="-514350">
+              <a:buFont typeface="+mj-lt"/>
+              <a:buAutoNum type="arabicPeriod"/>
+            </a:pPr>
+            <a:r>
+              <a:rPr lang="en-US" dirty="0" smtClean="0"/>
+              <a:t>Summation of the sub-blocks</a:t>
+            </a:r>
+          </a:p>
+          <a:p>
+            <a:pPr marL="514350" indent="-514350">
+              <a:buFont typeface="+mj-lt"/>
+              <a:buAutoNum type="arabicPeriod"/>
+            </a:pPr>
+            <a:endParaRPr lang="en-US" dirty="0" smtClean="0"/>
+          </a:p>
+          <a:p>
+            <a:pPr marL="514350" indent="-514350">
+              <a:buFont typeface="+mj-lt"/>
+              <a:buAutoNum type="arabicPeriod"/>
+            </a:pPr>
+            <a:endParaRPr lang="en-US" dirty="0"/>
+          </a:p>
+        </p:txBody>
+      </p:sp>
+    </p:spTree>
+    <p:extLst>
+      <p:ext uri="{BB962C8B-B14F-4D97-AF65-F5344CB8AC3E}">
+        <p14:creationId xmlns:p14="http://schemas.microsoft.com/office/powerpoint/2010/main" val="1857796561"/>
+      </p:ext>
+    </p:extLst>
+  </p:cSld>
+  <p:clrMapOvr>
+    <a:masterClrMapping/>
+  </p:clrMapOvr>
+  <p:timing>
+    <p:tnLst>
+      <p:par>
+        <p:cTn id="1" dur="indefinite" restart="never" nodeType="tmRoot"/>
+      </p:par>
+    </p:tnLst>
+  </p:timing>
 </p:sld>
 </file>
 
@@ -6004,203 +6193,6 @@
           <a:p>
             <a:r>
               <a:rPr lang="en-US" dirty="0" smtClean="0"/>
-              <a:t>Algorithm steps</a:t>
-            </a:r>
-            <a:endParaRPr lang="en-US" dirty="0"/>
-          </a:p>
-        </p:txBody>
-      </p:sp>
-      <p:sp>
-        <p:nvSpPr>
-          <p:cNvPr id="3" name="Content Placeholder 2"/>
-          <p:cNvSpPr>
-            <a:spLocks noGrp="1"/>
-          </p:cNvSpPr>
-          <p:nvPr>
-            <p:ph idx="1"/>
-          </p:nvPr>
-        </p:nvSpPr>
-        <p:spPr/>
-        <p:txBody>
-          <a:bodyPr>
-            <a:normAutofit lnSpcReduction="10000"/>
-          </a:bodyPr>
-          <a:lstStyle/>
-          <a:p>
-            <a:pPr marL="514350" indent="-514350">
-              <a:buFont typeface="+mj-lt"/>
-              <a:buAutoNum type="arabicPeriod"/>
-            </a:pPr>
-            <a:r>
-              <a:rPr lang="en-US" dirty="0" smtClean="0"/>
-              <a:t>Division of the N-long OFDM symbol into M sub-blocks:</a:t>
-            </a:r>
-          </a:p>
-          <a:p>
-            <a:pPr marL="971550" lvl="1" indent="-514350">
-              <a:buFont typeface="+mj-lt"/>
-              <a:buAutoNum type="arabicPeriod"/>
-            </a:pPr>
-            <a:r>
-              <a:rPr lang="en-US" dirty="0" smtClean="0"/>
-              <a:t>Contiguous</a:t>
-            </a:r>
-          </a:p>
-          <a:p>
-            <a:pPr marL="971550" lvl="1" indent="-514350">
-              <a:buFont typeface="+mj-lt"/>
-              <a:buAutoNum type="arabicPeriod"/>
-            </a:pPr>
-            <a:r>
-              <a:rPr lang="en-US" dirty="0" err="1"/>
-              <a:t>P</a:t>
-            </a:r>
-            <a:r>
-              <a:rPr lang="en-US" dirty="0" err="1" smtClean="0"/>
-              <a:t>olyphase</a:t>
-            </a:r>
-            <a:endParaRPr lang="en-US" dirty="0" smtClean="0"/>
-          </a:p>
-          <a:p>
-            <a:pPr marL="514350" indent="-514350">
-              <a:buFont typeface="+mj-lt"/>
-              <a:buAutoNum type="arabicPeriod"/>
-            </a:pPr>
-            <a:r>
-              <a:rPr lang="en-US" dirty="0" smtClean="0"/>
-              <a:t>Zero padding of each of the sub-blocks to length of N</a:t>
-            </a:r>
-          </a:p>
-          <a:p>
-            <a:pPr marL="514350" indent="-514350">
-              <a:buFont typeface="+mj-lt"/>
-              <a:buAutoNum type="arabicPeriod"/>
-            </a:pPr>
-            <a:r>
-              <a:rPr lang="en-US" dirty="0" smtClean="0"/>
-              <a:t>IDFT over each of the sub-blocks</a:t>
-            </a:r>
-          </a:p>
-          <a:p>
-            <a:pPr marL="514350" indent="-514350">
-              <a:buFont typeface="+mj-lt"/>
-              <a:buAutoNum type="arabicPeriod"/>
-            </a:pPr>
-            <a:r>
-              <a:rPr lang="en-US" dirty="0" smtClean="0"/>
-              <a:t>Calculation of optimum PTS coefficients vector:</a:t>
-            </a:r>
-          </a:p>
-          <a:p>
-            <a:pPr marL="971550" lvl="1" indent="-514350">
-              <a:buFont typeface="+mj-lt"/>
-              <a:buAutoNum type="arabicPeriod"/>
-            </a:pPr>
-            <a:r>
-              <a:rPr lang="en-US" dirty="0" smtClean="0"/>
-              <a:t>Iterative flipping</a:t>
-            </a:r>
-          </a:p>
-          <a:p>
-            <a:pPr marL="971550" lvl="1" indent="-514350">
-              <a:buFont typeface="+mj-lt"/>
-              <a:buAutoNum type="arabicPeriod"/>
-            </a:pPr>
-            <a:r>
-              <a:rPr lang="en-US" dirty="0" smtClean="0"/>
-              <a:t>Reduced complexity</a:t>
-            </a:r>
-          </a:p>
-          <a:p>
-            <a:pPr marL="514350" indent="-514350">
-              <a:buFont typeface="+mj-lt"/>
-              <a:buAutoNum type="arabicPeriod"/>
-            </a:pPr>
-            <a:r>
-              <a:rPr lang="en-US" dirty="0" smtClean="0"/>
-              <a:t>Multiplication of the sub-blocks by the PTS coefficients</a:t>
-            </a:r>
-          </a:p>
-          <a:p>
-            <a:pPr marL="514350" indent="-514350">
-              <a:buFont typeface="+mj-lt"/>
-              <a:buAutoNum type="arabicPeriod"/>
-            </a:pPr>
-            <a:r>
-              <a:rPr lang="en-US" dirty="0" smtClean="0"/>
-              <a:t>Summation of the sub-blocks</a:t>
-            </a:r>
-          </a:p>
-          <a:p>
-            <a:pPr marL="514350" indent="-514350">
-              <a:buFont typeface="+mj-lt"/>
-              <a:buAutoNum type="arabicPeriod"/>
-            </a:pPr>
-            <a:endParaRPr lang="en-US" dirty="0" smtClean="0"/>
-          </a:p>
-          <a:p>
-            <a:pPr marL="514350" indent="-514350">
-              <a:buFont typeface="+mj-lt"/>
-              <a:buAutoNum type="arabicPeriod"/>
-            </a:pPr>
-            <a:endParaRPr lang="en-US" dirty="0"/>
-          </a:p>
-        </p:txBody>
-      </p:sp>
-    </p:spTree>
-    <p:extLst>
-      <p:ext uri="{BB962C8B-B14F-4D97-AF65-F5344CB8AC3E}">
-        <p14:creationId xmlns:p14="http://schemas.microsoft.com/office/powerpoint/2010/main" val="1857796561"/>
-      </p:ext>
-    </p:extLst>
-  </p:cSld>
-  <p:clrMapOvr>
-    <a:masterClrMapping/>
-  </p:clrMapOvr>
-  <p:timing>
-    <p:tnLst>
-      <p:par>
-        <p:cTn id="1" dur="indefinite" restart="never" nodeType="tmRoot"/>
-      </p:par>
-    </p:tnLst>
-  </p:timing>
-</p:sld>
-</file>
-
-<file path=ppt/slides/slide22.xml><?xml version="1.0" encoding="utf-8"?>
-<p:sld xmlns:a="http://schemas.openxmlformats.org/drawingml/2006/main" xmlns:r="http://schemas.openxmlformats.org/officeDocument/2006/relationships" xmlns:p="http://schemas.openxmlformats.org/presentationml/2006/main">
-  <p:cSld>
-    <p:spTree>
-      <p:nvGrpSpPr>
-        <p:cNvPr id="1" name=""/>
-        <p:cNvGrpSpPr/>
-        <p:nvPr/>
-      </p:nvGrpSpPr>
-      <p:grpSpPr>
-        <a:xfrm>
-          <a:off x="0" y="0"/>
-          <a:ext cx="0" cy="0"/>
-          <a:chOff x="0" y="0"/>
-          <a:chExt cx="0" cy="0"/>
-        </a:xfrm>
-      </p:grpSpPr>
-      <p:sp>
-        <p:nvSpPr>
-          <p:cNvPr id="2" name="Title 1"/>
-          <p:cNvSpPr>
-            <a:spLocks noGrp="1"/>
-          </p:cNvSpPr>
-          <p:nvPr>
-            <p:ph type="title"/>
-          </p:nvPr>
-        </p:nvSpPr>
-        <p:spPr/>
-        <p:txBody>
-          <a:bodyPr/>
-          <a:lstStyle/>
-          <a:p>
-            <a:r>
-              <a:rPr lang="en-US" dirty="0" smtClean="0"/>
               <a:t>Mathematical development</a:t>
             </a:r>
             <a:endParaRPr lang="en-US" dirty="0"/>
@@ -6314,7 +6306,7 @@
           <a:graphicData uri="http://schemas.openxmlformats.org/presentationml/2006/ole">
             <mc:AlternateContent xmlns:mc="http://schemas.openxmlformats.org/markup-compatibility/2006">
               <mc:Choice xmlns:v="urn:schemas-microsoft-com:vml" Requires="v">
-                <p:oleObj spid="_x0000_s6273" name="Equation" r:id="rId3" imgW="190440" imgH="304560" progId="Equation.DSMT4">
+                <p:oleObj spid="_x0000_s6338" name="Equation" r:id="rId3" imgW="190440" imgH="304560" progId="Equation.DSMT4">
                   <p:embed/>
                 </p:oleObj>
               </mc:Choice>
@@ -6371,7 +6363,7 @@
           <a:graphicData uri="http://schemas.openxmlformats.org/presentationml/2006/ole">
             <mc:AlternateContent xmlns:mc="http://schemas.openxmlformats.org/markup-compatibility/2006">
               <mc:Choice xmlns:v="urn:schemas-microsoft-com:vml" Requires="v">
-                <p:oleObj spid="_x0000_s6274" name="Equation" r:id="rId5" imgW="647640" imgH="634680" progId="Equation.DSMT4">
+                <p:oleObj spid="_x0000_s6339" name="Equation" r:id="rId5" imgW="647640" imgH="634680" progId="Equation.DSMT4">
                   <p:embed/>
                 </p:oleObj>
               </mc:Choice>
@@ -6428,7 +6420,7 @@
           <a:graphicData uri="http://schemas.openxmlformats.org/presentationml/2006/ole">
             <mc:AlternateContent xmlns:mc="http://schemas.openxmlformats.org/markup-compatibility/2006">
               <mc:Choice xmlns:v="urn:schemas-microsoft-com:vml" Requires="v">
-                <p:oleObj spid="_x0000_s6275" name="Equation" r:id="rId7" imgW="558720" imgH="457200" progId="Equation.DSMT4">
+                <p:oleObj spid="_x0000_s6340" name="Equation" r:id="rId7" imgW="558720" imgH="457200" progId="Equation.DSMT4">
                   <p:embed/>
                 </p:oleObj>
               </mc:Choice>
@@ -6485,7 +6477,7 @@
           <a:graphicData uri="http://schemas.openxmlformats.org/presentationml/2006/ole">
             <mc:AlternateContent xmlns:mc="http://schemas.openxmlformats.org/markup-compatibility/2006">
               <mc:Choice xmlns:v="urn:schemas-microsoft-com:vml" Requires="v">
-                <p:oleObj spid="_x0000_s6276" name="Equation" r:id="rId9" imgW="761760" imgH="431640" progId="Equation.DSMT4">
+                <p:oleObj spid="_x0000_s6341" name="Equation" r:id="rId9" imgW="761760" imgH="431640" progId="Equation.DSMT4">
                   <p:embed/>
                 </p:oleObj>
               </mc:Choice>
@@ -6542,7 +6534,7 @@
           <a:graphicData uri="http://schemas.openxmlformats.org/presentationml/2006/ole">
             <mc:AlternateContent xmlns:mc="http://schemas.openxmlformats.org/markup-compatibility/2006">
               <mc:Choice xmlns:v="urn:schemas-microsoft-com:vml" Requires="v">
-                <p:oleObj spid="_x0000_s6277" name="Equation" r:id="rId11" imgW="1066680" imgH="431640" progId="Equation.DSMT4">
+                <p:oleObj spid="_x0000_s6342" name="Equation" r:id="rId11" imgW="1066680" imgH="431640" progId="Equation.DSMT4">
                   <p:embed/>
                 </p:oleObj>
               </mc:Choice>
@@ -6597,7 +6589,7 @@
 </p:sld>
 </file>
 
-<file path=ppt/slides/slide23.xml><?xml version="1.0" encoding="utf-8"?>
+<file path=ppt/slides/slide22.xml><?xml version="1.0" encoding="utf-8"?>
 <p:sld xmlns:a="http://schemas.openxmlformats.org/drawingml/2006/main" xmlns:r="http://schemas.openxmlformats.org/officeDocument/2006/relationships" xmlns:p="http://schemas.openxmlformats.org/presentationml/2006/main">
   <p:cSld>
     <p:spTree>
@@ -6724,7 +6716,7 @@
           <a:graphicData uri="http://schemas.openxmlformats.org/presentationml/2006/ole">
             <mc:AlternateContent xmlns:mc="http://schemas.openxmlformats.org/markup-compatibility/2006">
               <mc:Choice xmlns:v="urn:schemas-microsoft-com:vml" Requires="v">
-                <p:oleObj spid="_x0000_s7223" name="Equation" r:id="rId3" imgW="736560" imgH="431640" progId="Equation.DSMT4">
+                <p:oleObj spid="_x0000_s7249" name="Equation" r:id="rId3" imgW="736560" imgH="431640" progId="Equation.DSMT4">
                   <p:embed/>
                 </p:oleObj>
               </mc:Choice>
@@ -6781,7 +6773,7 @@
           <a:graphicData uri="http://schemas.openxmlformats.org/presentationml/2006/ole">
             <mc:AlternateContent xmlns:mc="http://schemas.openxmlformats.org/markup-compatibility/2006">
               <mc:Choice xmlns:v="urn:schemas-microsoft-com:vml" Requires="v">
-                <p:oleObj spid="_x0000_s7224" name="Equation" r:id="rId5" imgW="799920" imgH="444240" progId="Equation.DSMT4">
+                <p:oleObj spid="_x0000_s7250" name="Equation" r:id="rId5" imgW="799920" imgH="444240" progId="Equation.DSMT4">
                   <p:embed/>
                 </p:oleObj>
               </mc:Choice>
@@ -6836,7 +6828,7 @@
 </p:sld>
 </file>
 
-<file path=ppt/slides/slide24.xml><?xml version="1.0" encoding="utf-8"?>
+<file path=ppt/slides/slide23.xml><?xml version="1.0" encoding="utf-8"?>
 <p:sld xmlns:a="http://schemas.openxmlformats.org/drawingml/2006/main" xmlns:r="http://schemas.openxmlformats.org/officeDocument/2006/relationships" xmlns:p="http://schemas.openxmlformats.org/presentationml/2006/main">
   <p:cSld>
     <p:spTree>
@@ -6886,10 +6878,15 @@
             <p:ph idx="1"/>
           </p:nvPr>
         </p:nvSpPr>
-        <p:spPr/>
+        <p:spPr>
+          <a:xfrm>
+            <a:off x="838200" y="1371600"/>
+            <a:ext cx="10515600" cy="5384800"/>
+          </a:xfrm>
+        </p:spPr>
         <p:txBody>
           <a:bodyPr>
-            <a:normAutofit lnSpcReduction="10000"/>
+            <a:normAutofit/>
           </a:bodyPr>
           <a:lstStyle/>
           <a:p>
@@ -6944,15 +6941,24 @@
             <a:pPr lvl="1"/>
             <a:r>
               <a:rPr lang="en-US" dirty="0" smtClean="0"/>
-              <a:t>Typical values of PTS coefficients:</a:t>
-            </a:r>
+              <a:t>Typical values of PTS coefficients</a:t>
+            </a:r>
+            <a:r>
+              <a:rPr lang="en-US" dirty="0" smtClean="0"/>
+              <a:t>:</a:t>
+            </a:r>
+          </a:p>
+          <a:p>
+            <a:pPr lvl="1"/>
+            <a:endParaRPr lang="en-US" dirty="0" smtClean="0"/>
           </a:p>
           <a:p>
             <a:pPr lvl="2"/>
             <a:r>
               <a:rPr lang="en-US" dirty="0" smtClean="0"/>
-              <a:t>Example  </a:t>
-            </a:r>
+              <a:t>Example:  </a:t>
+            </a:r>
+            <a:endParaRPr lang="en-US" dirty="0" smtClean="0"/>
           </a:p>
           <a:p>
             <a:pPr lvl="1"/>
@@ -6976,20 +6982,20 @@
           <p:nvPr>
             <p:extLst>
               <p:ext uri="{D42A27DB-BD31-4B8C-83A1-F6EECF244321}">
-                <p14:modId xmlns:p14="http://schemas.microsoft.com/office/powerpoint/2010/main" val="3086740275"/>
+                <p14:modId xmlns:p14="http://schemas.microsoft.com/office/powerpoint/2010/main" val="2833475409"/>
               </p:ext>
             </p:extLst>
           </p:nvPr>
         </p:nvGraphicFramePr>
         <p:xfrm>
-          <a:off x="3209332" y="5027139"/>
+          <a:off x="3138212" y="5170707"/>
           <a:ext cx="3099890" cy="624954"/>
         </p:xfrm>
         <a:graphic>
           <a:graphicData uri="http://schemas.openxmlformats.org/presentationml/2006/ole">
             <mc:AlternateContent xmlns:mc="http://schemas.openxmlformats.org/markup-compatibility/2006">
               <mc:Choice xmlns:v="urn:schemas-microsoft-com:vml" Requires="v">
-                <p:oleObj spid="_x0000_s9266" name="Equation" r:id="rId3" imgW="1257120" imgH="253800" progId="Equation.DSMT4">
+                <p:oleObj spid="_x0000_s9292" name="Equation" r:id="rId3" imgW="1257120" imgH="253800" progId="Equation.DSMT4">
                   <p:embed/>
                 </p:oleObj>
               </mc:Choice>
@@ -7010,7 +7016,7 @@
                     </p:blipFill>
                     <p:spPr>
                       <a:xfrm>
-                        <a:off x="3209332" y="5027139"/>
+                        <a:off x="3138212" y="5170707"/>
                         <a:ext cx="3099890" cy="624954"/>
                       </a:xfrm>
                       <a:prstGeom prst="rect">
@@ -7033,20 +7039,20 @@
           <p:nvPr>
             <p:extLst>
               <p:ext uri="{D42A27DB-BD31-4B8C-83A1-F6EECF244321}">
-                <p14:modId xmlns:p14="http://schemas.microsoft.com/office/powerpoint/2010/main" val="4264667638"/>
+                <p14:modId xmlns:p14="http://schemas.microsoft.com/office/powerpoint/2010/main" val="1763118971"/>
               </p:ext>
             </p:extLst>
           </p:nvPr>
         </p:nvGraphicFramePr>
         <p:xfrm>
-          <a:off x="6309222" y="4019704"/>
+          <a:off x="6360022" y="3968904"/>
           <a:ext cx="2547938" cy="1423988"/>
         </p:xfrm>
         <a:graphic>
           <a:graphicData uri="http://schemas.openxmlformats.org/presentationml/2006/ole">
             <mc:AlternateContent xmlns:mc="http://schemas.openxmlformats.org/markup-compatibility/2006">
               <mc:Choice xmlns:v="urn:schemas-microsoft-com:vml" Requires="v">
-                <p:oleObj spid="_x0000_s9267" name="Equation" r:id="rId5" imgW="952200" imgH="533160" progId="Equation.DSMT4">
+                <p:oleObj spid="_x0000_s9293" name="Equation" r:id="rId5" imgW="952200" imgH="533160" progId="Equation.DSMT4">
                   <p:embed/>
                 </p:oleObj>
               </mc:Choice>
@@ -7067,7 +7073,7 @@
                     </p:blipFill>
                     <p:spPr>
                       <a:xfrm>
-                        <a:off x="6309222" y="4019704"/>
+                        <a:off x="6360022" y="3968904"/>
                         <a:ext cx="2547938" cy="1423988"/>
                       </a:xfrm>
                       <a:prstGeom prst="rect">
@@ -7101,7 +7107,7 @@
 </p:sld>
 </file>
 
-<file path=ppt/slides/slide25.xml><?xml version="1.0" encoding="utf-8"?>
+<file path=ppt/slides/slide24.xml><?xml version="1.0" encoding="utf-8"?>
 <p:sld xmlns:a="http://schemas.openxmlformats.org/drawingml/2006/main" xmlns:r="http://schemas.openxmlformats.org/officeDocument/2006/relationships" xmlns:p="http://schemas.openxmlformats.org/presentationml/2006/main">
   <p:cSld>
     <p:spTree>
@@ -7276,7 +7282,7 @@
 </p:sld>
 </file>
 
-<file path=ppt/slides/slide26.xml><?xml version="1.0" encoding="utf-8"?>
+<file path=ppt/slides/slide25.xml><?xml version="1.0" encoding="utf-8"?>
 <p:sld xmlns:a="http://schemas.openxmlformats.org/drawingml/2006/main" xmlns:r="http://schemas.openxmlformats.org/officeDocument/2006/relationships" xmlns:p="http://schemas.openxmlformats.org/presentationml/2006/main">
   <p:cSld>
     <p:spTree>
@@ -7334,8 +7340,8 @@
         </p:blipFill>
         <p:spPr>
           <a:xfrm>
-            <a:off x="491319" y="1583140"/>
-            <a:ext cx="10862481" cy="4913193"/>
+            <a:off x="416561" y="1572980"/>
+            <a:ext cx="11308080" cy="4913193"/>
           </a:xfrm>
           <a:prstGeom prst="rect">
             <a:avLst/>
@@ -7362,7 +7368,7 @@
 </p:sld>
 </file>
 
-<file path=ppt/slides/slide27.xml><?xml version="1.0" encoding="utf-8"?>
+<file path=ppt/slides/slide26.xml><?xml version="1.0" encoding="utf-8"?>
 <p:sld xmlns:a="http://schemas.openxmlformats.org/drawingml/2006/main" xmlns:r="http://schemas.openxmlformats.org/officeDocument/2006/relationships" xmlns:p="http://schemas.openxmlformats.org/presentationml/2006/main">
   <p:cSld>
     <p:spTree>
@@ -7448,6 +7454,92 @@
 </p:sld>
 </file>
 
+<file path=ppt/slides/slide27.xml><?xml version="1.0" encoding="utf-8"?>
+<p:sld xmlns:a="http://schemas.openxmlformats.org/drawingml/2006/main" xmlns:r="http://schemas.openxmlformats.org/officeDocument/2006/relationships" xmlns:p="http://schemas.openxmlformats.org/presentationml/2006/main">
+  <p:cSld>
+    <p:spTree>
+      <p:nvGrpSpPr>
+        <p:cNvPr id="1" name=""/>
+        <p:cNvGrpSpPr/>
+        <p:nvPr/>
+      </p:nvGrpSpPr>
+      <p:grpSpPr>
+        <a:xfrm>
+          <a:off x="0" y="0"/>
+          <a:ext cx="0" cy="0"/>
+          <a:chOff x="0" y="0"/>
+          <a:chExt cx="0" cy="0"/>
+        </a:xfrm>
+      </p:grpSpPr>
+      <p:sp>
+        <p:nvSpPr>
+          <p:cNvPr id="2" name="Title 1"/>
+          <p:cNvSpPr>
+            <a:spLocks noGrp="1"/>
+          </p:cNvSpPr>
+          <p:nvPr>
+            <p:ph type="title"/>
+          </p:nvPr>
+        </p:nvSpPr>
+        <p:spPr/>
+        <p:txBody>
+          <a:bodyPr/>
+          <a:lstStyle/>
+          <a:p>
+            <a:r>
+              <a:rPr lang="en-US" dirty="0" smtClean="0"/>
+              <a:t>Simulation (EVM)</a:t>
+            </a:r>
+            <a:endParaRPr lang="en-US" dirty="0"/>
+          </a:p>
+        </p:txBody>
+      </p:sp>
+      <p:pic>
+        <p:nvPicPr>
+          <p:cNvPr id="6" name="Content Placeholder 5"/>
+          <p:cNvPicPr>
+            <a:picLocks noGrp="1" noChangeAspect="1"/>
+          </p:cNvPicPr>
+          <p:nvPr>
+            <p:ph idx="1"/>
+          </p:nvPr>
+        </p:nvPicPr>
+        <p:blipFill>
+          <a:blip r:embed="rId2"/>
+          <a:stretch>
+            <a:fillRect/>
+          </a:stretch>
+        </p:blipFill>
+        <p:spPr>
+          <a:xfrm>
+            <a:off x="1016000" y="1825625"/>
+            <a:ext cx="10007600" cy="4351338"/>
+          </a:xfrm>
+          <a:prstGeom prst="rect">
+            <a:avLst/>
+          </a:prstGeom>
+        </p:spPr>
+      </p:pic>
+    </p:spTree>
+    <p:extLst>
+      <p:ext uri="{BB962C8B-B14F-4D97-AF65-F5344CB8AC3E}">
+        <p14:creationId xmlns:p14="http://schemas.microsoft.com/office/powerpoint/2010/main" val="2585972670"/>
+      </p:ext>
+    </p:extLst>
+  </p:cSld>
+  <p:clrMapOvr>
+    <a:masterClrMapping/>
+  </p:clrMapOvr>
+  <p:timing>
+    <p:tnLst>
+      <p:par>
+        <p:cTn id="1" dur="indefinite" restart="never" nodeType="tmRoot"/>
+      </p:par>
+    </p:tnLst>
+  </p:timing>
+</p:sld>
+</file>
+
 <file path=ppt/slides/slide28.xml><?xml version="1.0" encoding="utf-8"?>
 <p:sld xmlns:a="http://schemas.openxmlformats.org/drawingml/2006/main" xmlns:r="http://schemas.openxmlformats.org/officeDocument/2006/relationships" xmlns:p="http://schemas.openxmlformats.org/presentationml/2006/main">
   <p:cSld>
@@ -7481,43 +7573,103 @@
           <a:lstStyle/>
           <a:p>
             <a:r>
-              <a:rPr lang="en-US" dirty="0" smtClean="0"/>
-              <a:t>Simulation (EVM)</a:t>
+              <a:rPr lang="en-US" dirty="0"/>
+              <a:t>Calculation of PTS coefficients- </a:t>
+            </a:r>
+            <a:r>
+              <a:rPr lang="en-US" dirty="0" smtClean="0"/>
+              <a:t>Reduced Complexity [4]</a:t>
             </a:r>
             <a:endParaRPr lang="en-US" dirty="0"/>
           </a:p>
         </p:txBody>
       </p:sp>
-      <p:pic>
-        <p:nvPicPr>
-          <p:cNvPr id="6" name="Content Placeholder 5"/>
-          <p:cNvPicPr>
-            <a:picLocks noGrp="1" noChangeAspect="1"/>
-          </p:cNvPicPr>
+      <p:sp>
+        <p:nvSpPr>
+          <p:cNvPr id="3" name="Content Placeholder 2"/>
+          <p:cNvSpPr>
+            <a:spLocks noGrp="1"/>
+          </p:cNvSpPr>
           <p:nvPr>
             <p:ph idx="1"/>
           </p:nvPr>
-        </p:nvPicPr>
-        <p:blipFill>
-          <a:blip r:embed="rId2"/>
-          <a:stretch>
-            <a:fillRect/>
-          </a:stretch>
-        </p:blipFill>
-        <p:spPr>
-          <a:xfrm>
-            <a:off x="1378074" y="1825625"/>
-            <a:ext cx="9435852" cy="4351338"/>
-          </a:xfrm>
-          <a:prstGeom prst="rect">
-            <a:avLst/>
-          </a:prstGeom>
-        </p:spPr>
-      </p:pic>
+        </p:nvSpPr>
+        <p:spPr/>
+        <p:txBody>
+          <a:bodyPr/>
+          <a:lstStyle/>
+          <a:p>
+            <a:r>
+              <a:rPr lang="en-US" sz="3000" dirty="0"/>
+              <a:t>It is to provide very close performance in terms of PAPR reduction </a:t>
+            </a:r>
+            <a:r>
+              <a:rPr lang="en-US" sz="3000" dirty="0" err="1"/>
+              <a:t>wrt</a:t>
+            </a:r>
+            <a:r>
+              <a:rPr lang="en-US" sz="3000" dirty="0"/>
+              <a:t> the ideal PTS, yet with reduced complexity</a:t>
+            </a:r>
+          </a:p>
+          <a:p>
+            <a:r>
+              <a:rPr lang="en-US" sz="3000" dirty="0" smtClean="0"/>
+              <a:t>Based on gradient descent search algorithm useful in combinatorial optimization problems suggested by  </a:t>
+            </a:r>
+            <a:r>
+              <a:rPr lang="en-US" sz="3000" dirty="0" err="1" smtClean="0"/>
+              <a:t>Aarts</a:t>
+            </a:r>
+            <a:r>
+              <a:rPr lang="en-US" sz="3000" dirty="0" smtClean="0"/>
+              <a:t> &amp; </a:t>
+            </a:r>
+            <a:r>
+              <a:rPr lang="en-US" sz="3000" dirty="0" err="1" smtClean="0"/>
+              <a:t>Lenstra</a:t>
+            </a:r>
+            <a:endParaRPr lang="en-US" sz="3000" dirty="0" smtClean="0"/>
+          </a:p>
+          <a:p>
+            <a:pPr marL="228600" lvl="1">
+              <a:spcBef>
+                <a:spcPts val="1000"/>
+              </a:spcBef>
+            </a:pPr>
+            <a:r>
+              <a:rPr lang="en-US" sz="3000" dirty="0" smtClean="0"/>
+              <a:t>Principle: </a:t>
+            </a:r>
+            <a:r>
+              <a:rPr lang="en-US" sz="3000" dirty="0"/>
+              <a:t>Find </a:t>
+            </a:r>
+            <a:r>
+              <a:rPr lang="en-US" sz="3000" dirty="0" smtClean="0"/>
+              <a:t>gradient and optimum step simultaneously, by running over </a:t>
+            </a:r>
+            <a:r>
+              <a:rPr lang="en-US" sz="3000" dirty="0"/>
+              <a:t>the r-distant b </a:t>
+            </a:r>
+            <a:r>
+              <a:rPr lang="en-US" sz="3000" dirty="0" smtClean="0"/>
+              <a:t>vectors from an initial guess. Repeat that I times</a:t>
+            </a:r>
+          </a:p>
+          <a:p>
+            <a:endParaRPr lang="en-US" dirty="0" smtClean="0"/>
+          </a:p>
+          <a:p>
+            <a:endParaRPr lang="en-US" dirty="0"/>
+          </a:p>
+        </p:txBody>
+      </p:sp>
     </p:spTree>
     <p:extLst>
       <p:ext uri="{BB962C8B-B14F-4D97-AF65-F5344CB8AC3E}">
-        <p14:creationId xmlns:p14="http://schemas.microsoft.com/office/powerpoint/2010/main" val="2585972670"/>
+        <p14:creationId xmlns:p14="http://schemas.microsoft.com/office/powerpoint/2010/main" val="1589355528"/>
       </p:ext>
     </p:extLst>
   </p:cSld>
@@ -7568,13 +7720,8 @@
           <a:p>
             <a:r>
               <a:rPr lang="en-US" dirty="0"/>
-              <a:t>Calculation of PTS coefficients- </a:t>
-            </a:r>
-            <a:r>
-              <a:rPr lang="en-US" dirty="0" smtClean="0"/>
-              <a:t>Reduced Complexity [4]</a:t>
-            </a:r>
-            <a:endParaRPr lang="en-US" dirty="0"/>
+              <a:t>Calculation of PTS coefficients- Reduced Complexity [4]</a:t>
+            </a:r>
           </a:p>
         </p:txBody>
       </p:sp>
@@ -7593,69 +7740,121 @@
           <a:bodyPr/>
           <a:lstStyle/>
           <a:p>
-            <a:r>
-              <a:rPr lang="en-US" sz="3000" dirty="0"/>
-              <a:t>It is to provide very close performance in terms of PAPR reduction </a:t>
-            </a:r>
-            <a:r>
-              <a:rPr lang="en-US" sz="3000" dirty="0" err="1"/>
-              <a:t>wrt</a:t>
-            </a:r>
-            <a:r>
-              <a:rPr lang="en-US" sz="3000" dirty="0"/>
-              <a:t> the ideal PTS, yet with reduced complexity</a:t>
-            </a:r>
-          </a:p>
-          <a:p>
-            <a:r>
-              <a:rPr lang="en-US" sz="3000" dirty="0" smtClean="0"/>
-              <a:t>Based on gradient descent search algorithm useful in combinatorial optimization problems suggested by  </a:t>
-            </a:r>
-            <a:r>
-              <a:rPr lang="en-US" sz="3000" dirty="0" err="1" smtClean="0"/>
-              <a:t>Aarts</a:t>
-            </a:r>
-            <a:r>
-              <a:rPr lang="en-US" sz="3000" dirty="0" smtClean="0"/>
-              <a:t> &amp; </a:t>
-            </a:r>
-            <a:r>
-              <a:rPr lang="en-US" sz="3000" dirty="0" err="1" smtClean="0"/>
-              <a:t>Lenstra</a:t>
-            </a:r>
-            <a:endParaRPr lang="en-US" sz="3000" dirty="0" smtClean="0"/>
-          </a:p>
-          <a:p>
-            <a:pPr marL="228600" lvl="1">
-              <a:spcBef>
-                <a:spcPts val="1000"/>
-              </a:spcBef>
+            <a:pPr marL="514350" indent="-514350">
+              <a:buFont typeface="+mj-lt"/>
+              <a:buAutoNum type="arabicPeriod"/>
             </a:pPr>
             <a:r>
-              <a:rPr lang="en-US" sz="3000" dirty="0" smtClean="0"/>
-              <a:t>Principle: </a:t>
-            </a:r>
-            <a:r>
-              <a:rPr lang="en-US" sz="3000" dirty="0"/>
-              <a:t>Find </a:t>
-            </a:r>
-            <a:r>
-              <a:rPr lang="en-US" sz="3000" dirty="0" smtClean="0"/>
-              <a:t>gradient and optimum step simultaneously, by running over </a:t>
-            </a:r>
-            <a:r>
-              <a:rPr lang="en-US" sz="3000" dirty="0"/>
-              <a:t>the r-distant b </a:t>
-            </a:r>
-            <a:r>
-              <a:rPr lang="en-US" sz="3000" dirty="0" smtClean="0"/>
-              <a:t>vectors from an initial guess. Repeat that I times</a:t>
-            </a:r>
-          </a:p>
-          <a:p>
+              <a:rPr lang="en-US" dirty="0" err="1" smtClean="0"/>
+              <a:t>i</a:t>
+            </a:r>
+            <a:r>
+              <a:rPr lang="en-US" dirty="0" smtClean="0"/>
+              <a:t>=1</a:t>
+            </a:r>
+          </a:p>
+          <a:p>
+            <a:pPr marL="514350" indent="-514350">
+              <a:buFont typeface="+mj-lt"/>
+              <a:buAutoNum type="arabicPeriod"/>
+            </a:pPr>
+            <a:r>
+              <a:rPr lang="en-US" dirty="0" err="1" smtClean="0"/>
+              <a:t>b_initial</a:t>
+            </a:r>
+            <a:r>
+              <a:rPr lang="en-US" dirty="0" smtClean="0"/>
+              <a:t>=ones(M,1). </a:t>
+            </a:r>
+            <a:r>
+              <a:rPr lang="en-US" dirty="0" err="1" smtClean="0"/>
+              <a:t>b_opt</a:t>
+            </a:r>
+            <a:r>
+              <a:rPr lang="en-US" dirty="0" smtClean="0"/>
+              <a:t>=</a:t>
+            </a:r>
+            <a:r>
+              <a:rPr lang="en-US" dirty="0" err="1" smtClean="0"/>
+              <a:t>b_initial</a:t>
+            </a:r>
             <a:endParaRPr lang="en-US" dirty="0" smtClean="0"/>
           </a:p>
           <a:p>
+            <a:pPr marL="514350" indent="-514350">
+              <a:buFont typeface="+mj-lt"/>
+              <a:buAutoNum type="arabicPeriod"/>
+            </a:pPr>
+            <a:r>
+              <a:rPr lang="en-US" dirty="0" smtClean="0"/>
+              <a:t>Run over all M-long b vectors r-Hamming away from </a:t>
+            </a:r>
+            <a:r>
+              <a:rPr lang="en-US" dirty="0" err="1" smtClean="0"/>
+              <a:t>b_opt</a:t>
+            </a:r>
+            <a:r>
+              <a:rPr lang="en-US" dirty="0" smtClean="0"/>
+              <a:t>, assign all </a:t>
+            </a:r>
+            <a:r>
+              <a:rPr lang="en-US" dirty="0" err="1" smtClean="0"/>
+              <a:t>W^r</a:t>
+            </a:r>
+            <a:r>
+              <a:rPr lang="en-US" dirty="0" smtClean="0"/>
+              <a:t> possible values and compute PAPR</a:t>
+            </a:r>
+          </a:p>
+          <a:p>
+            <a:pPr marL="514350" indent="-514350">
+              <a:buFont typeface="+mj-lt"/>
+              <a:buAutoNum type="arabicPeriod"/>
+            </a:pPr>
+            <a:r>
+              <a:rPr lang="en-US" dirty="0" smtClean="0"/>
+              <a:t>Save </a:t>
+            </a:r>
+            <a:r>
+              <a:rPr lang="en-US" dirty="0" err="1" smtClean="0"/>
+              <a:t>b_opt</a:t>
+            </a:r>
+            <a:r>
+              <a:rPr lang="en-US" dirty="0" smtClean="0"/>
+              <a:t>; the one bringing to minimum the PAPR </a:t>
+            </a:r>
+          </a:p>
+          <a:p>
+            <a:pPr marL="514350" indent="-514350">
+              <a:buFont typeface="+mj-lt"/>
+              <a:buAutoNum type="arabicPeriod"/>
+            </a:pPr>
+            <a:r>
+              <a:rPr lang="en-US" dirty="0" smtClean="0"/>
+              <a:t>If </a:t>
+            </a:r>
+            <a:r>
+              <a:rPr lang="en-US" dirty="0" err="1" smtClean="0"/>
+              <a:t>i</a:t>
+            </a:r>
+            <a:r>
+              <a:rPr lang="en-US" dirty="0" smtClean="0"/>
+              <a:t>&lt;I: Increase </a:t>
+            </a:r>
+            <a:r>
+              <a:rPr lang="en-US" dirty="0" err="1" smtClean="0"/>
+              <a:t>i</a:t>
+            </a:r>
+            <a:r>
+              <a:rPr lang="en-US" dirty="0" smtClean="0"/>
+              <a:t> by 1 and return to step 3. else - terminate</a:t>
+            </a:r>
+          </a:p>
+          <a:p>
+            <a:pPr marL="514350" indent="-514350">
+              <a:buFont typeface="+mj-lt"/>
+              <a:buAutoNum type="arabicPeriod"/>
+            </a:pPr>
             <a:endParaRPr lang="en-US" dirty="0"/>
           </a:p>
         </p:txBody>
@@ -7663,7 +7862,7 @@
     </p:spTree>
     <p:extLst>
       <p:ext uri="{BB962C8B-B14F-4D97-AF65-F5344CB8AC3E}">
-        <p14:creationId xmlns:p14="http://schemas.microsoft.com/office/powerpoint/2010/main" val="1589355528"/>
+        <p14:creationId xmlns:p14="http://schemas.microsoft.com/office/powerpoint/2010/main" val="3380807740"/>
       </p:ext>
     </p:extLst>
   </p:cSld>
@@ -7752,6 +7951,13 @@
   <p:clrMapOvr>
     <a:masterClrMapping/>
   </p:clrMapOvr>
+  <p:timing>
+    <p:tnLst>
+      <p:par>
+        <p:cTn id="1" dur="indefinite" restart="never" nodeType="tmRoot"/>
+      </p:par>
+    </p:tnLst>
+  </p:timing>
 </p:sld>
 </file>
 
@@ -7788,155 +7994,289 @@
           <a:lstStyle/>
           <a:p>
             <a:r>
-              <a:rPr lang="en-US" dirty="0"/>
-              <a:t>Calculation of PTS coefficients- Reduced Complexity [4]</a:t>
-            </a:r>
-          </a:p>
-        </p:txBody>
-      </p:sp>
-      <p:sp>
-        <p:nvSpPr>
-          <p:cNvPr id="3" name="Content Placeholder 2"/>
-          <p:cNvSpPr>
-            <a:spLocks noGrp="1"/>
-          </p:cNvSpPr>
+              <a:rPr lang="en-US" dirty="0" smtClean="0"/>
+              <a:t>Expected results (vs. unmodulated, vs. ideal)</a:t>
+            </a:r>
+            <a:endParaRPr lang="en-US" dirty="0"/>
+          </a:p>
+        </p:txBody>
+      </p:sp>
+      <p:pic>
+        <p:nvPicPr>
+          <p:cNvPr id="4" name="Content Placeholder 3"/>
+          <p:cNvPicPr>
+            <a:picLocks noGrp="1" noChangeAspect="1"/>
+          </p:cNvPicPr>
           <p:nvPr>
             <p:ph idx="1"/>
           </p:nvPr>
-        </p:nvSpPr>
-        <p:spPr/>
-        <p:txBody>
-          <a:bodyPr/>
-          <a:lstStyle/>
-          <a:p>
-            <a:pPr marL="514350" indent="-514350">
-              <a:buFont typeface="+mj-lt"/>
-              <a:buAutoNum type="arabicPeriod"/>
-            </a:pPr>
-            <a:r>
-              <a:rPr lang="en-US" dirty="0" err="1" smtClean="0"/>
-              <a:t>i</a:t>
-            </a:r>
-            <a:r>
-              <a:rPr lang="en-US" dirty="0" smtClean="0"/>
-              <a:t>=1</a:t>
-            </a:r>
-          </a:p>
-          <a:p>
-            <a:pPr marL="514350" indent="-514350">
-              <a:buFont typeface="+mj-lt"/>
-              <a:buAutoNum type="arabicPeriod"/>
-            </a:pPr>
-            <a:r>
-              <a:rPr lang="en-US" dirty="0" err="1" smtClean="0"/>
-              <a:t>b</a:t>
-            </a:r>
-            <a:r>
-              <a:rPr lang="en-US" dirty="0" err="1" smtClean="0"/>
-              <a:t>_initial</a:t>
-            </a:r>
-            <a:r>
-              <a:rPr lang="en-US" dirty="0" smtClean="0"/>
-              <a:t>=ones(M,1). </a:t>
-            </a:r>
-            <a:r>
-              <a:rPr lang="en-US" dirty="0" err="1" smtClean="0"/>
-              <a:t>b_opt</a:t>
-            </a:r>
-            <a:r>
-              <a:rPr lang="en-US" dirty="0" smtClean="0"/>
-              <a:t>=</a:t>
-            </a:r>
-            <a:r>
-              <a:rPr lang="en-US" dirty="0" err="1" smtClean="0"/>
-              <a:t>b_initial</a:t>
-            </a:r>
-            <a:endParaRPr lang="en-US" dirty="0" smtClean="0"/>
-          </a:p>
-          <a:p>
-            <a:pPr marL="514350" indent="-514350">
-              <a:buFont typeface="+mj-lt"/>
-              <a:buAutoNum type="arabicPeriod"/>
-            </a:pPr>
-            <a:r>
-              <a:rPr lang="en-US" dirty="0" smtClean="0"/>
-              <a:t>Run over all M-long b vectors r-Hamming away from </a:t>
-            </a:r>
-            <a:r>
-              <a:rPr lang="en-US" dirty="0" err="1" smtClean="0"/>
-              <a:t>b_opt</a:t>
-            </a:r>
-            <a:r>
-              <a:rPr lang="en-US" dirty="0" smtClean="0"/>
-              <a:t>, assign all </a:t>
-            </a:r>
-            <a:r>
-              <a:rPr lang="en-US" dirty="0" err="1" smtClean="0"/>
-              <a:t>W^r</a:t>
-            </a:r>
-            <a:r>
-              <a:rPr lang="en-US" dirty="0" smtClean="0"/>
-              <a:t> possible values and compute PAPR</a:t>
-            </a:r>
-          </a:p>
-          <a:p>
-            <a:pPr marL="514350" indent="-514350">
-              <a:buFont typeface="+mj-lt"/>
-              <a:buAutoNum type="arabicPeriod"/>
-            </a:pPr>
-            <a:r>
-              <a:rPr lang="en-US" dirty="0" smtClean="0"/>
-              <a:t>Save </a:t>
-            </a:r>
-            <a:r>
-              <a:rPr lang="en-US" dirty="0" err="1" smtClean="0"/>
-              <a:t>b_opt</a:t>
-            </a:r>
-            <a:r>
-              <a:rPr lang="en-US" dirty="0" smtClean="0"/>
-              <a:t>; the one bringing to minimum the PAPR </a:t>
-            </a:r>
-          </a:p>
-          <a:p>
-            <a:pPr marL="514350" indent="-514350">
-              <a:buFont typeface="+mj-lt"/>
-              <a:buAutoNum type="arabicPeriod"/>
-            </a:pPr>
-            <a:r>
-              <a:rPr lang="en-US" dirty="0" smtClean="0"/>
-              <a:t>If </a:t>
-            </a:r>
-            <a:r>
-              <a:rPr lang="en-US" dirty="0" err="1" smtClean="0"/>
-              <a:t>i</a:t>
-            </a:r>
-            <a:r>
-              <a:rPr lang="en-US" dirty="0" smtClean="0"/>
-              <a:t>&lt;I: Increase </a:t>
-            </a:r>
-            <a:r>
-              <a:rPr lang="en-US" dirty="0" err="1" smtClean="0"/>
-              <a:t>i</a:t>
-            </a:r>
-            <a:r>
-              <a:rPr lang="en-US" dirty="0" smtClean="0"/>
-              <a:t> by 1 and return to step 3. else - terminate</a:t>
-            </a:r>
-            <a:endParaRPr lang="en-US" dirty="0" smtClean="0"/>
-          </a:p>
-          <a:p>
-            <a:pPr marL="514350" indent="-514350">
-              <a:buFont typeface="+mj-lt"/>
-              <a:buAutoNum type="arabicPeriod"/>
-            </a:pPr>
-            <a:endParaRPr lang="en-US" dirty="0"/>
-          </a:p>
-        </p:txBody>
-      </p:sp>
+        </p:nvPicPr>
+        <p:blipFill>
+          <a:blip r:embed="rId2"/>
+          <a:stretch>
+            <a:fillRect/>
+          </a:stretch>
+        </p:blipFill>
+        <p:spPr>
+          <a:xfrm>
+            <a:off x="1310185" y="1690688"/>
+            <a:ext cx="10043615" cy="4317822"/>
+          </a:xfrm>
+          <a:prstGeom prst="rect">
+            <a:avLst/>
+          </a:prstGeom>
+        </p:spPr>
+      </p:pic>
+      <p:sp>
+        <p:nvSpPr>
+          <p:cNvPr id="3" name="TextBox 2"/>
+          <p:cNvSpPr txBox="1"/>
+          <p:nvPr/>
+        </p:nvSpPr>
+        <p:spPr>
+          <a:xfrm>
+            <a:off x="2804160" y="6008510"/>
+            <a:ext cx="854721" cy="369332"/>
+          </a:xfrm>
+          <a:prstGeom prst="rect">
+            <a:avLst/>
+          </a:prstGeom>
+          <a:noFill/>
+        </p:spPr>
+        <p:txBody>
+          <a:bodyPr wrap="none" rtlCol="0">
+            <a:spAutoFit/>
+          </a:bodyPr>
+          <a:lstStyle/>
+          <a:p>
+            <a:r>
+              <a:rPr lang="en-US" dirty="0" smtClean="0">
+                <a:solidFill>
+                  <a:srgbClr val="FF0000"/>
+                </a:solidFill>
+              </a:rPr>
+              <a:t>Classic </a:t>
+            </a:r>
+            <a:endParaRPr lang="en-US" dirty="0">
+              <a:solidFill>
+                <a:srgbClr val="FF0000"/>
+              </a:solidFill>
+            </a:endParaRPr>
+          </a:p>
+        </p:txBody>
+      </p:sp>
+      <p:cxnSp>
+        <p:nvCxnSpPr>
+          <p:cNvPr id="6" name="Straight Arrow Connector 5"/>
+          <p:cNvCxnSpPr/>
+          <p:nvPr/>
+        </p:nvCxnSpPr>
+        <p:spPr>
+          <a:xfrm flipV="1">
+            <a:off x="3241040" y="4450080"/>
+            <a:ext cx="1452880" cy="1558430"/>
+          </a:xfrm>
+          <a:prstGeom prst="straightConnector1">
+            <a:avLst/>
+          </a:prstGeom>
+          <a:ln>
+            <a:tailEnd type="triangle"/>
+          </a:ln>
+        </p:spPr>
+        <p:style>
+          <a:lnRef idx="1">
+            <a:schemeClr val="accent1"/>
+          </a:lnRef>
+          <a:fillRef idx="0">
+            <a:schemeClr val="accent1"/>
+          </a:fillRef>
+          <a:effectRef idx="0">
+            <a:schemeClr val="accent1"/>
+          </a:effectRef>
+          <a:fontRef idx="minor">
+            <a:schemeClr val="tx1"/>
+          </a:fontRef>
+        </p:style>
+      </p:cxnSp>
+      <p:sp>
+        <p:nvSpPr>
+          <p:cNvPr id="7" name="TextBox 6"/>
+          <p:cNvSpPr txBox="1"/>
+          <p:nvPr/>
+        </p:nvSpPr>
+        <p:spPr>
+          <a:xfrm>
+            <a:off x="4592320" y="6008510"/>
+            <a:ext cx="1534160" cy="646331"/>
+          </a:xfrm>
+          <a:prstGeom prst="rect">
+            <a:avLst/>
+          </a:prstGeom>
+          <a:noFill/>
+        </p:spPr>
+        <p:txBody>
+          <a:bodyPr wrap="square" rtlCol="0">
+            <a:spAutoFit/>
+          </a:bodyPr>
+          <a:lstStyle/>
+          <a:p>
+            <a:r>
+              <a:rPr lang="en-US" dirty="0" smtClean="0">
+                <a:solidFill>
+                  <a:srgbClr val="FF0000"/>
+                </a:solidFill>
+              </a:rPr>
+              <a:t>Reduced complexity</a:t>
+            </a:r>
+            <a:endParaRPr lang="en-US" dirty="0">
+              <a:solidFill>
+                <a:srgbClr val="FF0000"/>
+              </a:solidFill>
+            </a:endParaRPr>
+          </a:p>
+        </p:txBody>
+      </p:sp>
+      <p:cxnSp>
+        <p:nvCxnSpPr>
+          <p:cNvPr id="8" name="Straight Arrow Connector 7"/>
+          <p:cNvCxnSpPr/>
+          <p:nvPr/>
+        </p:nvCxnSpPr>
+        <p:spPr>
+          <a:xfrm flipV="1">
+            <a:off x="5029200" y="4531360"/>
+            <a:ext cx="223520" cy="1477150"/>
+          </a:xfrm>
+          <a:prstGeom prst="straightConnector1">
+            <a:avLst/>
+          </a:prstGeom>
+          <a:ln>
+            <a:tailEnd type="triangle"/>
+          </a:ln>
+        </p:spPr>
+        <p:style>
+          <a:lnRef idx="1">
+            <a:schemeClr val="accent1"/>
+          </a:lnRef>
+          <a:fillRef idx="0">
+            <a:schemeClr val="accent1"/>
+          </a:fillRef>
+          <a:effectRef idx="0">
+            <a:schemeClr val="accent1"/>
+          </a:effectRef>
+          <a:fontRef idx="minor">
+            <a:schemeClr val="tx1"/>
+          </a:fontRef>
+        </p:style>
+      </p:cxnSp>
+      <p:cxnSp>
+        <p:nvCxnSpPr>
+          <p:cNvPr id="10" name="Straight Arrow Connector 9"/>
+          <p:cNvCxnSpPr/>
+          <p:nvPr/>
+        </p:nvCxnSpPr>
+        <p:spPr>
+          <a:xfrm flipV="1">
+            <a:off x="5064760" y="4531360"/>
+            <a:ext cx="939800" cy="1477150"/>
+          </a:xfrm>
+          <a:prstGeom prst="straightConnector1">
+            <a:avLst/>
+          </a:prstGeom>
+          <a:ln>
+            <a:tailEnd type="triangle"/>
+          </a:ln>
+        </p:spPr>
+        <p:style>
+          <a:lnRef idx="1">
+            <a:schemeClr val="accent1"/>
+          </a:lnRef>
+          <a:fillRef idx="0">
+            <a:schemeClr val="accent1"/>
+          </a:fillRef>
+          <a:effectRef idx="0">
+            <a:schemeClr val="accent1"/>
+          </a:effectRef>
+          <a:fontRef idx="minor">
+            <a:schemeClr val="tx1"/>
+          </a:fontRef>
+        </p:style>
+      </p:cxnSp>
+      <p:sp>
+        <p:nvSpPr>
+          <p:cNvPr id="13" name="TextBox 12"/>
+          <p:cNvSpPr txBox="1"/>
+          <p:nvPr/>
+        </p:nvSpPr>
+        <p:spPr>
+          <a:xfrm>
+            <a:off x="8910320" y="5967870"/>
+            <a:ext cx="1534160" cy="923330"/>
+          </a:xfrm>
+          <a:prstGeom prst="rect">
+            <a:avLst/>
+          </a:prstGeom>
+          <a:noFill/>
+        </p:spPr>
+        <p:txBody>
+          <a:bodyPr wrap="square" rtlCol="0">
+            <a:spAutoFit/>
+          </a:bodyPr>
+          <a:lstStyle/>
+          <a:p>
+            <a:r>
+              <a:rPr lang="en-US" dirty="0" smtClean="0">
+                <a:solidFill>
+                  <a:srgbClr val="FF0000"/>
+                </a:solidFill>
+              </a:rPr>
+              <a:t>No PAPR reduction: 10.6dB</a:t>
+            </a:r>
+            <a:endParaRPr lang="en-US" dirty="0">
+              <a:solidFill>
+                <a:srgbClr val="FF0000"/>
+              </a:solidFill>
+            </a:endParaRPr>
+          </a:p>
+        </p:txBody>
+      </p:sp>
+      <p:cxnSp>
+        <p:nvCxnSpPr>
+          <p:cNvPr id="14" name="Straight Arrow Connector 13"/>
+          <p:cNvCxnSpPr/>
+          <p:nvPr/>
+        </p:nvCxnSpPr>
+        <p:spPr>
+          <a:xfrm flipV="1">
+            <a:off x="9382760" y="4490720"/>
+            <a:ext cx="939800" cy="1477150"/>
+          </a:xfrm>
+          <a:prstGeom prst="straightConnector1">
+            <a:avLst/>
+          </a:prstGeom>
+          <a:ln>
+            <a:tailEnd type="triangle"/>
+          </a:ln>
+        </p:spPr>
+        <p:style>
+          <a:lnRef idx="1">
+            <a:schemeClr val="accent1"/>
+          </a:lnRef>
+          <a:fillRef idx="0">
+            <a:schemeClr val="accent1"/>
+          </a:fillRef>
+          <a:effectRef idx="0">
+            <a:schemeClr val="accent1"/>
+          </a:effectRef>
+          <a:fontRef idx="minor">
+            <a:schemeClr val="tx1"/>
+          </a:fontRef>
+        </p:style>
+      </p:cxnSp>
     </p:spTree>
     <p:extLst>
       <p:ext uri="{BB962C8B-B14F-4D97-AF65-F5344CB8AC3E}">
-        <p14:creationId xmlns:p14="http://schemas.microsoft.com/office/powerpoint/2010/main" val="3380807740"/>
+        <p14:creationId xmlns:p14="http://schemas.microsoft.com/office/powerpoint/2010/main" val="404505912"/>
       </p:ext>
     </p:extLst>
   </p:cSld>
@@ -7987,7 +8327,15 @@
           <a:p>
             <a:r>
               <a:rPr lang="en-US" dirty="0" smtClean="0"/>
-              <a:t>Expected results (vs. unmodulated, vs. ideal)</a:t>
+              <a:t>Chosen set of parameters (</a:t>
+            </a:r>
+            <a:r>
+              <a:rPr lang="en-US" dirty="0" err="1" smtClean="0"/>
+              <a:t>r,I</a:t>
+            </a:r>
+            <a:r>
+              <a:rPr lang="en-US" dirty="0" smtClean="0"/>
+              <a:t>)</a:t>
             </a:r>
             <a:endParaRPr lang="en-US" dirty="0"/>
           </a:p>
@@ -7995,7 +8343,7 @@
       </p:sp>
       <p:pic>
         <p:nvPicPr>
-          <p:cNvPr id="4" name="Content Placeholder 3"/>
+          <p:cNvPr id="4" name="Content Placeholder 6"/>
           <p:cNvPicPr>
             <a:picLocks noGrp="1" noChangeAspect="1"/>
           </p:cNvPicPr>
@@ -8011,18 +8359,138 @@
         </p:blipFill>
         <p:spPr>
           <a:xfrm>
-            <a:off x="1310185" y="1690688"/>
-            <a:ext cx="10043615" cy="4317822"/>
+            <a:off x="838200" y="1825625"/>
+            <a:ext cx="10002520" cy="4351338"/>
           </a:xfrm>
           <a:prstGeom prst="rect">
             <a:avLst/>
           </a:prstGeom>
         </p:spPr>
       </p:pic>
+      <p:sp>
+        <p:nvSpPr>
+          <p:cNvPr id="3" name="Rectangle 2"/>
+          <p:cNvSpPr/>
+          <p:nvPr/>
+        </p:nvSpPr>
+        <p:spPr>
+          <a:xfrm>
+            <a:off x="2326640" y="4267200"/>
+            <a:ext cx="1452880" cy="233680"/>
+          </a:xfrm>
+          <a:prstGeom prst="rect">
+            <a:avLst/>
+          </a:prstGeom>
+          <a:noFill/>
+          <a:ln w="28575">
+            <a:solidFill>
+              <a:srgbClr val="FF0000"/>
+            </a:solidFill>
+          </a:ln>
+        </p:spPr>
+        <p:style>
+          <a:lnRef idx="2">
+            <a:schemeClr val="accent1">
+              <a:shade val="50000"/>
+            </a:schemeClr>
+          </a:lnRef>
+          <a:fillRef idx="1">
+            <a:schemeClr val="accent1"/>
+          </a:fillRef>
+          <a:effectRef idx="0">
+            <a:schemeClr val="accent1"/>
+          </a:effectRef>
+          <a:fontRef idx="minor">
+            <a:schemeClr val="lt1"/>
+          </a:fontRef>
+        </p:style>
+        <p:txBody>
+          <a:bodyPr rtlCol="0" anchor="ctr"/>
+          <a:lstStyle/>
+          <a:p>
+            <a:pPr algn="ctr"/>
+            <a:endParaRPr lang="en-US"/>
+          </a:p>
+        </p:txBody>
+      </p:sp>
+      <p:sp>
+        <p:nvSpPr>
+          <p:cNvPr id="5" name="TextBox 4"/>
+          <p:cNvSpPr txBox="1"/>
+          <p:nvPr/>
+        </p:nvSpPr>
+        <p:spPr>
+          <a:xfrm>
+            <a:off x="411640" y="4724400"/>
+            <a:ext cx="853119" cy="369332"/>
+          </a:xfrm>
+          <a:prstGeom prst="rect">
+            <a:avLst/>
+          </a:prstGeom>
+          <a:noFill/>
+        </p:spPr>
+        <p:txBody>
+          <a:bodyPr wrap="none" rtlCol="0">
+            <a:spAutoFit/>
+          </a:bodyPr>
+          <a:lstStyle/>
+          <a:p>
+            <a:r>
+              <a:rPr lang="en-US" dirty="0" smtClean="0">
+                <a:solidFill>
+                  <a:srgbClr val="FF0000"/>
+                </a:solidFill>
+              </a:rPr>
+              <a:t>chosen</a:t>
+            </a:r>
+            <a:endParaRPr lang="en-US" dirty="0">
+              <a:solidFill>
+                <a:srgbClr val="FF0000"/>
+              </a:solidFill>
+            </a:endParaRPr>
+          </a:p>
+        </p:txBody>
+      </p:sp>
+      <p:cxnSp>
+        <p:nvCxnSpPr>
+          <p:cNvPr id="7" name="Straight Arrow Connector 6"/>
+          <p:cNvCxnSpPr/>
+          <p:nvPr/>
+        </p:nvCxnSpPr>
+        <p:spPr>
+          <a:xfrm flipV="1">
+            <a:off x="1280160" y="4384040"/>
+            <a:ext cx="1046480" cy="533400"/>
+          </a:xfrm>
+          <a:prstGeom prst="straightConnector1">
+            <a:avLst/>
+          </a:prstGeom>
+          <a:ln>
+            <a:solidFill>
+              <a:srgbClr val="FF0000"/>
+            </a:solidFill>
+            <a:tailEnd type="triangle"/>
+          </a:ln>
+        </p:spPr>
+        <p:style>
+          <a:lnRef idx="1">
+            <a:schemeClr val="accent1"/>
+          </a:lnRef>
+          <a:fillRef idx="0">
+            <a:schemeClr val="accent1"/>
+          </a:fillRef>
+          <a:effectRef idx="0">
+            <a:schemeClr val="accent1"/>
+          </a:effectRef>
+          <a:fontRef idx="minor">
+            <a:schemeClr val="tx1"/>
+          </a:fontRef>
+        </p:style>
+      </p:cxnSp>
     </p:spTree>
     <p:extLst>
       <p:ext uri="{BB962C8B-B14F-4D97-AF65-F5344CB8AC3E}">
-        <p14:creationId xmlns:p14="http://schemas.microsoft.com/office/powerpoint/2010/main" val="404505912"/>
+        <p14:creationId xmlns:p14="http://schemas.microsoft.com/office/powerpoint/2010/main" val="4118840855"/>
       </p:ext>
     </p:extLst>
   </p:cSld>
@@ -8073,100 +8541,6 @@
           <a:p>
             <a:r>
               <a:rPr lang="en-US" dirty="0" smtClean="0"/>
-              <a:t>Chosen set of parameters (</a:t>
-            </a:r>
-            <a:r>
-              <a:rPr lang="en-US" dirty="0" err="1" smtClean="0"/>
-              <a:t>r,I</a:t>
-            </a:r>
-            <a:r>
-              <a:rPr lang="en-US" dirty="0" smtClean="0"/>
-              <a:t>)</a:t>
-            </a:r>
-            <a:endParaRPr lang="en-US" dirty="0"/>
-          </a:p>
-        </p:txBody>
-      </p:sp>
-      <p:pic>
-        <p:nvPicPr>
-          <p:cNvPr id="4" name="Content Placeholder 6"/>
-          <p:cNvPicPr>
-            <a:picLocks noGrp="1" noChangeAspect="1"/>
-          </p:cNvPicPr>
-          <p:nvPr>
-            <p:ph idx="1"/>
-          </p:nvPr>
-        </p:nvPicPr>
-        <p:blipFill>
-          <a:blip r:embed="rId2"/>
-          <a:stretch>
-            <a:fillRect/>
-          </a:stretch>
-        </p:blipFill>
-        <p:spPr>
-          <a:xfrm>
-            <a:off x="2183642" y="1825625"/>
-            <a:ext cx="6624189" cy="4351338"/>
-          </a:xfrm>
-          <a:prstGeom prst="rect">
-            <a:avLst/>
-          </a:prstGeom>
-        </p:spPr>
-      </p:pic>
-    </p:spTree>
-    <p:extLst>
-      <p:ext uri="{BB962C8B-B14F-4D97-AF65-F5344CB8AC3E}">
-        <p14:creationId xmlns:p14="http://schemas.microsoft.com/office/powerpoint/2010/main" val="4118840855"/>
-      </p:ext>
-    </p:extLst>
-  </p:cSld>
-  <p:clrMapOvr>
-    <a:masterClrMapping/>
-  </p:clrMapOvr>
-  <p:timing>
-    <p:tnLst>
-      <p:par>
-        <p:cTn id="1" dur="indefinite" restart="never" nodeType="tmRoot"/>
-      </p:par>
-    </p:tnLst>
-  </p:timing>
-</p:sld>
-</file>
-
-<file path=ppt/slides/slide33.xml><?xml version="1.0" encoding="utf-8"?>
-<p:sld xmlns:a="http://schemas.openxmlformats.org/drawingml/2006/main" xmlns:r="http://schemas.openxmlformats.org/officeDocument/2006/relationships" xmlns:p="http://schemas.openxmlformats.org/presentationml/2006/main">
-  <p:cSld>
-    <p:spTree>
-      <p:nvGrpSpPr>
-        <p:cNvPr id="1" name=""/>
-        <p:cNvGrpSpPr/>
-        <p:nvPr/>
-      </p:nvGrpSpPr>
-      <p:grpSpPr>
-        <a:xfrm>
-          <a:off x="0" y="0"/>
-          <a:ext cx="0" cy="0"/>
-          <a:chOff x="0" y="0"/>
-          <a:chExt cx="0" cy="0"/>
-        </a:xfrm>
-      </p:grpSpPr>
-      <p:sp>
-        <p:nvSpPr>
-          <p:cNvPr id="2" name="Title 1"/>
-          <p:cNvSpPr>
-            <a:spLocks noGrp="1"/>
-          </p:cNvSpPr>
-          <p:nvPr>
-            <p:ph type="title"/>
-          </p:nvPr>
-        </p:nvSpPr>
-        <p:spPr/>
-        <p:txBody>
-          <a:bodyPr/>
-          <a:lstStyle/>
-          <a:p>
-            <a:r>
-              <a:rPr lang="en-US" dirty="0" smtClean="0"/>
               <a:t>Simulation Vs. Article</a:t>
             </a:r>
             <a:endParaRPr lang="en-US" dirty="0"/>
@@ -8225,6 +8599,229 @@
           </a:prstGeom>
         </p:spPr>
       </p:pic>
+      <p:sp>
+        <p:nvSpPr>
+          <p:cNvPr id="3" name="TextBox 2"/>
+          <p:cNvSpPr txBox="1"/>
+          <p:nvPr/>
+        </p:nvSpPr>
+        <p:spPr>
+          <a:xfrm>
+            <a:off x="7729991" y="5938924"/>
+            <a:ext cx="776175" cy="369332"/>
+          </a:xfrm>
+          <a:prstGeom prst="rect">
+            <a:avLst/>
+          </a:prstGeom>
+          <a:noFill/>
+        </p:spPr>
+        <p:txBody>
+          <a:bodyPr wrap="none" rtlCol="0">
+            <a:spAutoFit/>
+          </a:bodyPr>
+          <a:lstStyle/>
+          <a:p>
+            <a:r>
+              <a:rPr lang="en-US" dirty="0" smtClean="0">
+                <a:solidFill>
+                  <a:srgbClr val="FF0000"/>
+                </a:solidFill>
+              </a:rPr>
+              <a:t>6.3 dB</a:t>
+            </a:r>
+            <a:endParaRPr lang="en-US" dirty="0">
+              <a:solidFill>
+                <a:srgbClr val="FF0000"/>
+              </a:solidFill>
+            </a:endParaRPr>
+          </a:p>
+        </p:txBody>
+      </p:sp>
+      <p:sp>
+        <p:nvSpPr>
+          <p:cNvPr id="6" name="TextBox 5"/>
+          <p:cNvSpPr txBox="1"/>
+          <p:nvPr/>
+        </p:nvSpPr>
+        <p:spPr>
+          <a:xfrm>
+            <a:off x="3178311" y="6035512"/>
+            <a:ext cx="893193" cy="369332"/>
+          </a:xfrm>
+          <a:prstGeom prst="rect">
+            <a:avLst/>
+          </a:prstGeom>
+          <a:noFill/>
+        </p:spPr>
+        <p:txBody>
+          <a:bodyPr wrap="none" rtlCol="0">
+            <a:spAutoFit/>
+          </a:bodyPr>
+          <a:lstStyle/>
+          <a:p>
+            <a:r>
+              <a:rPr lang="en-US" dirty="0" smtClean="0">
+                <a:solidFill>
+                  <a:srgbClr val="FF0000"/>
+                </a:solidFill>
+              </a:rPr>
+              <a:t>5.95 dB</a:t>
+            </a:r>
+            <a:endParaRPr lang="en-US" dirty="0">
+              <a:solidFill>
+                <a:srgbClr val="FF0000"/>
+              </a:solidFill>
+            </a:endParaRPr>
+          </a:p>
+        </p:txBody>
+      </p:sp>
+      <p:cxnSp>
+        <p:nvCxnSpPr>
+          <p:cNvPr id="5" name="Straight Arrow Connector 4"/>
+          <p:cNvCxnSpPr>
+            <a:stCxn id="6" idx="0"/>
+          </p:cNvCxnSpPr>
+          <p:nvPr/>
+        </p:nvCxnSpPr>
+        <p:spPr>
+          <a:xfrm flipH="1" flipV="1">
+            <a:off x="3352800" y="5069840"/>
+            <a:ext cx="272108" cy="965672"/>
+          </a:xfrm>
+          <a:prstGeom prst="straightConnector1">
+            <a:avLst/>
+          </a:prstGeom>
+          <a:ln>
+            <a:solidFill>
+              <a:srgbClr val="FF0000"/>
+            </a:solidFill>
+            <a:tailEnd type="triangle"/>
+          </a:ln>
+        </p:spPr>
+        <p:style>
+          <a:lnRef idx="1">
+            <a:schemeClr val="accent1"/>
+          </a:lnRef>
+          <a:fillRef idx="0">
+            <a:schemeClr val="accent1"/>
+          </a:fillRef>
+          <a:effectRef idx="0">
+            <a:schemeClr val="accent1"/>
+          </a:effectRef>
+          <a:fontRef idx="minor">
+            <a:schemeClr val="tx1"/>
+          </a:fontRef>
+        </p:style>
+      </p:cxnSp>
+      <p:cxnSp>
+        <p:nvCxnSpPr>
+          <p:cNvPr id="10" name="Straight Arrow Connector 9"/>
+          <p:cNvCxnSpPr>
+            <a:stCxn id="3" idx="0"/>
+          </p:cNvCxnSpPr>
+          <p:nvPr/>
+        </p:nvCxnSpPr>
+        <p:spPr>
+          <a:xfrm flipV="1">
+            <a:off x="8118079" y="4724401"/>
+            <a:ext cx="1025921" cy="1214523"/>
+          </a:xfrm>
+          <a:prstGeom prst="straightConnector1">
+            <a:avLst/>
+          </a:prstGeom>
+          <a:ln>
+            <a:solidFill>
+              <a:srgbClr val="FF0000"/>
+            </a:solidFill>
+            <a:tailEnd type="triangle"/>
+          </a:ln>
+        </p:spPr>
+        <p:style>
+          <a:lnRef idx="1">
+            <a:schemeClr val="accent1"/>
+          </a:lnRef>
+          <a:fillRef idx="0">
+            <a:schemeClr val="accent1"/>
+          </a:fillRef>
+          <a:effectRef idx="0">
+            <a:schemeClr val="accent1"/>
+          </a:effectRef>
+          <a:fontRef idx="minor">
+            <a:schemeClr val="tx1"/>
+          </a:fontRef>
+        </p:style>
+      </p:cxnSp>
+      <p:sp>
+        <p:nvSpPr>
+          <p:cNvPr id="13" name="TextBox 12"/>
+          <p:cNvSpPr txBox="1"/>
+          <p:nvPr/>
+        </p:nvSpPr>
+        <p:spPr>
+          <a:xfrm>
+            <a:off x="4326109" y="5924510"/>
+            <a:ext cx="1534160" cy="923330"/>
+          </a:xfrm>
+          <a:prstGeom prst="rect">
+            <a:avLst/>
+          </a:prstGeom>
+          <a:noFill/>
+        </p:spPr>
+        <p:txBody>
+          <a:bodyPr wrap="square" rtlCol="0">
+            <a:spAutoFit/>
+          </a:bodyPr>
+          <a:lstStyle/>
+          <a:p>
+            <a:r>
+              <a:rPr lang="en-US" dirty="0" smtClean="0">
+                <a:solidFill>
+                  <a:srgbClr val="FF0000"/>
+                </a:solidFill>
+              </a:rPr>
+              <a:t>No PAPR reduction: 10.2dB</a:t>
+            </a:r>
+            <a:endParaRPr lang="en-US" dirty="0">
+              <a:solidFill>
+                <a:srgbClr val="FF0000"/>
+              </a:solidFill>
+            </a:endParaRPr>
+          </a:p>
+        </p:txBody>
+      </p:sp>
+      <p:cxnSp>
+        <p:nvCxnSpPr>
+          <p:cNvPr id="14" name="Straight Arrow Connector 13"/>
+          <p:cNvCxnSpPr/>
+          <p:nvPr/>
+        </p:nvCxnSpPr>
+        <p:spPr>
+          <a:xfrm flipV="1">
+            <a:off x="4798549" y="5066105"/>
+            <a:ext cx="52850" cy="858405"/>
+          </a:xfrm>
+          <a:prstGeom prst="straightConnector1">
+            <a:avLst/>
+          </a:prstGeom>
+          <a:ln>
+            <a:tailEnd type="triangle"/>
+          </a:ln>
+        </p:spPr>
+        <p:style>
+          <a:lnRef idx="1">
+            <a:schemeClr val="accent1"/>
+          </a:lnRef>
+          <a:fillRef idx="0">
+            <a:schemeClr val="accent1"/>
+          </a:fillRef>
+          <a:effectRef idx="0">
+            <a:schemeClr val="accent1"/>
+          </a:effectRef>
+          <a:fontRef idx="minor">
+            <a:schemeClr val="tx1"/>
+          </a:fontRef>
+        </p:style>
+      </p:cxnSp>
     </p:spTree>
     <p:extLst>
       <p:ext uri="{BB962C8B-B14F-4D97-AF65-F5344CB8AC3E}">
@@ -8245,7 +8842,7 @@
 </p:sld>
 </file>
 
-<file path=ppt/slides/slide34.xml><?xml version="1.0" encoding="utf-8"?>
+<file path=ppt/slides/slide33.xml><?xml version="1.0" encoding="utf-8"?>
 <p:sld xmlns:a="http://schemas.openxmlformats.org/drawingml/2006/main" xmlns:r="http://schemas.openxmlformats.org/officeDocument/2006/relationships" xmlns:p="http://schemas.openxmlformats.org/presentationml/2006/main">
   <p:cSld>
     <p:spTree>
@@ -8331,7 +8928,7 @@
 </p:sld>
 </file>
 
-<file path=ppt/slides/slide35.xml><?xml version="1.0" encoding="utf-8"?>
+<file path=ppt/slides/slide34.xml><?xml version="1.0" encoding="utf-8"?>
 <p:sld xmlns:a="http://schemas.openxmlformats.org/drawingml/2006/main" xmlns:r="http://schemas.openxmlformats.org/officeDocument/2006/relationships" xmlns:p="http://schemas.openxmlformats.org/presentationml/2006/main">
   <p:cSld>
     <p:spTree>
@@ -8388,7 +8985,7 @@
         <p:spPr/>
         <p:txBody>
           <a:bodyPr>
-            <a:normAutofit fontScale="92500" lnSpcReduction="20000"/>
+            <a:normAutofit fontScale="85000" lnSpcReduction="20000"/>
           </a:bodyPr>
           <a:lstStyle/>
           <a:p>
@@ -8398,19 +8995,19 @@
               </a:spcBef>
             </a:pPr>
             <a:r>
-              <a:rPr lang="en-US" dirty="0" smtClean="0"/>
+              <a:rPr lang="en-US" sz="2600" dirty="0" smtClean="0"/>
               <a:t>Reduced Complexity algorithm: </a:t>
             </a:r>
             <a:r>
-              <a:rPr lang="en-US" dirty="0"/>
+              <a:rPr lang="en-US" sz="2600" dirty="0"/>
               <a:t>at every </a:t>
             </a:r>
             <a:r>
-              <a:rPr lang="en-US" dirty="0" err="1"/>
+              <a:rPr lang="en-US" sz="2600" dirty="0" err="1"/>
               <a:t>i</a:t>
             </a:r>
             <a:r>
-              <a:rPr lang="en-US" dirty="0"/>
+              <a:rPr lang="en-US" sz="2600" dirty="0"/>
               <a:t>&lt;=I</a:t>
             </a:r>
           </a:p>
@@ -8421,7 +9018,7 @@
               </a:spcBef>
             </a:pPr>
             <a:r>
-              <a:rPr lang="en-US" sz="2400" dirty="0"/>
+              <a:rPr lang="en-US" sz="2600" dirty="0"/>
               <a:t>We run over r choose M-1 different r-Hamming distant b vectors</a:t>
             </a:r>
           </a:p>
@@ -8432,15 +9029,15 @@
               </a:spcBef>
             </a:pPr>
             <a:r>
-              <a:rPr lang="en-US" sz="2400" dirty="0"/>
+              <a:rPr lang="en-US" sz="2600" dirty="0"/>
               <a:t>For every vector, we try </a:t>
             </a:r>
             <a:r>
-              <a:rPr lang="en-US" sz="2400" dirty="0" err="1"/>
+              <a:rPr lang="en-US" sz="2600" dirty="0" err="1"/>
               <a:t>W^r</a:t>
             </a:r>
             <a:r>
-              <a:rPr lang="en-US" sz="2400" dirty="0"/>
+              <a:rPr lang="en-US" sz="2600" dirty="0"/>
               <a:t> different values for the r different terms</a:t>
             </a:r>
           </a:p>
@@ -8451,10 +9048,10 @@
               </a:spcBef>
             </a:pPr>
             <a:r>
-              <a:rPr lang="en-US" sz="2400" dirty="0"/>
+              <a:rPr lang="en-US" sz="2600" dirty="0"/>
               <a:t>Conclusion: </a:t>
             </a:r>
-            <a:endParaRPr lang="en-US" sz="2400" dirty="0" smtClean="0"/>
+            <a:endParaRPr lang="en-US" sz="2600" dirty="0" smtClean="0"/>
           </a:p>
           <a:p>
             <a:pPr marL="228600" lvl="1">
@@ -8462,7 +9059,7 @@
                 <a:spcPts val="1000"/>
               </a:spcBef>
             </a:pPr>
-            <a:endParaRPr lang="en-US" dirty="0"/>
+            <a:endParaRPr lang="en-US" sz="2600" dirty="0"/>
           </a:p>
           <a:p>
             <a:pPr marL="228600" lvl="1">
@@ -8470,7 +9067,7 @@
                 <a:spcPts val="1000"/>
               </a:spcBef>
             </a:pPr>
-            <a:endParaRPr lang="en-US" dirty="0" smtClean="0"/>
+            <a:endParaRPr lang="en-US" sz="2600" dirty="0" smtClean="0"/>
           </a:p>
           <a:p>
             <a:pPr marL="0" lvl="1" indent="0">
@@ -8479,7 +9076,7 @@
               </a:spcBef>
               <a:buNone/>
             </a:pPr>
-            <a:endParaRPr lang="en-US" dirty="0"/>
+            <a:endParaRPr lang="en-US" sz="2600" dirty="0"/>
           </a:p>
           <a:p>
             <a:pPr marL="228600" lvl="1">
@@ -8488,11 +9085,11 @@
               </a:spcBef>
             </a:pPr>
             <a:r>
-              <a:rPr lang="en-US" dirty="0"/>
+              <a:rPr lang="en-US" sz="2600" dirty="0"/>
               <a:t>Iterative </a:t>
             </a:r>
             <a:r>
-              <a:rPr lang="en-US" dirty="0" smtClean="0"/>
+              <a:rPr lang="en-US" sz="2600" dirty="0" smtClean="0"/>
               <a:t>flipping algorithm:</a:t>
             </a:r>
           </a:p>
@@ -8502,7 +9099,7 @@
                 <a:spcPts val="1000"/>
               </a:spcBef>
             </a:pPr>
-            <a:endParaRPr lang="en-US" dirty="0"/>
+            <a:endParaRPr lang="en-US" sz="2600" dirty="0"/>
           </a:p>
           <a:p>
             <a:pPr marL="228600" lvl="1">
@@ -8511,7 +9108,7 @@
               </a:spcBef>
             </a:pPr>
             <a:r>
-              <a:rPr lang="en-US" dirty="0" smtClean="0"/>
+              <a:rPr lang="en-US" sz="2600" dirty="0" smtClean="0"/>
               <a:t>Example: I=1, M=8, W=4, r=2</a:t>
             </a:r>
           </a:p>
@@ -8522,7 +9119,7 @@
               </a:spcBef>
             </a:pPr>
             <a:r>
-              <a:rPr lang="en-US" dirty="0" smtClean="0"/>
+              <a:rPr lang="en-US" sz="2600" dirty="0" smtClean="0"/>
               <a:t>Reduced complexity: 336 steps</a:t>
             </a:r>
           </a:p>
@@ -8533,7 +9130,7 @@
               </a:spcBef>
             </a:pPr>
             <a:r>
-              <a:rPr lang="en-US" dirty="0" smtClean="0"/>
+              <a:rPr lang="en-US" sz="2600" dirty="0" smtClean="0"/>
               <a:t>Iterative flipping: 28 steps</a:t>
             </a:r>
           </a:p>
@@ -8564,7 +9161,7 @@
           <a:graphicData uri="http://schemas.openxmlformats.org/presentationml/2006/ole">
             <mc:AlternateContent xmlns:mc="http://schemas.openxmlformats.org/markup-compatibility/2006">
               <mc:Choice xmlns:v="urn:schemas-microsoft-com:vml" Requires="v">
-                <p:oleObj spid="_x0000_s11296" name="Equation" r:id="rId3" imgW="939600" imgH="457200" progId="Equation.DSMT4">
+                <p:oleObj spid="_x0000_s11322" name="Equation" r:id="rId3" imgW="939600" imgH="457200" progId="Equation.DSMT4">
                   <p:embed/>
                 </p:oleObj>
               </mc:Choice>
@@ -8608,20 +9205,20 @@
           <p:nvPr>
             <p:extLst>
               <p:ext uri="{D42A27DB-BD31-4B8C-83A1-F6EECF244321}">
-                <p14:modId xmlns:p14="http://schemas.microsoft.com/office/powerpoint/2010/main" val="1784640581"/>
+                <p14:modId xmlns:p14="http://schemas.microsoft.com/office/powerpoint/2010/main" val="2680838180"/>
               </p:ext>
             </p:extLst>
           </p:nvPr>
         </p:nvGraphicFramePr>
         <p:xfrm>
-          <a:off x="4680897" y="4761338"/>
+          <a:off x="4371975" y="4136231"/>
           <a:ext cx="1724025" cy="500063"/>
         </p:xfrm>
         <a:graphic>
           <a:graphicData uri="http://schemas.openxmlformats.org/presentationml/2006/ole">
             <mc:AlternateContent xmlns:mc="http://schemas.openxmlformats.org/markup-compatibility/2006">
               <mc:Choice xmlns:v="urn:schemas-microsoft-com:vml" Requires="v">
-                <p:oleObj spid="_x0000_s11297" name="Equation" r:id="rId5" imgW="698400" imgH="203040" progId="Equation.DSMT4">
+                <p:oleObj spid="_x0000_s11323" name="Equation" r:id="rId5" imgW="698400" imgH="203040" progId="Equation.DSMT4">
                   <p:embed/>
                 </p:oleObj>
               </mc:Choice>
@@ -8642,7 +9239,7 @@
                     </p:blipFill>
                     <p:spPr>
                       <a:xfrm>
-                        <a:off x="4680897" y="4761338"/>
+                        <a:off x="4371975" y="4136231"/>
                         <a:ext cx="1724025" cy="500063"/>
                       </a:xfrm>
                       <a:prstGeom prst="rect">
@@ -8676,7 +9273,7 @@
 </p:sld>
 </file>
 
-<file path=ppt/slides/slide36.xml><?xml version="1.0" encoding="utf-8"?>
+<file path=ppt/slides/slide35.xml><?xml version="1.0" encoding="utf-8"?>
 <p:sld xmlns:a="http://schemas.openxmlformats.org/drawingml/2006/main" xmlns:r="http://schemas.openxmlformats.org/officeDocument/2006/relationships" xmlns:p="http://schemas.openxmlformats.org/presentationml/2006/main">
   <p:cSld>
     <p:spTree>
@@ -8757,6 +9354,97 @@
   <p:clrMapOvr>
     <a:masterClrMapping/>
   </p:clrMapOvr>
+  <p:timing>
+    <p:tnLst>
+      <p:par>
+        <p:cTn id="1" dur="indefinite" restart="never" nodeType="tmRoot"/>
+      </p:par>
+    </p:tnLst>
+  </p:timing>
+</p:sld>
+</file>
+
+<file path=ppt/slides/slide36.xml><?xml version="1.0" encoding="utf-8"?>
+<p:sld xmlns:a="http://schemas.openxmlformats.org/drawingml/2006/main" xmlns:r="http://schemas.openxmlformats.org/officeDocument/2006/relationships" xmlns:p="http://schemas.openxmlformats.org/presentationml/2006/main">
+  <p:cSld>
+    <p:spTree>
+      <p:nvGrpSpPr>
+        <p:cNvPr id="1" name=""/>
+        <p:cNvGrpSpPr/>
+        <p:nvPr/>
+      </p:nvGrpSpPr>
+      <p:grpSpPr>
+        <a:xfrm>
+          <a:off x="0" y="0"/>
+          <a:ext cx="0" cy="0"/>
+          <a:chOff x="0" y="0"/>
+          <a:chExt cx="0" cy="0"/>
+        </a:xfrm>
+      </p:grpSpPr>
+      <p:sp>
+        <p:nvSpPr>
+          <p:cNvPr id="2" name="Title 1"/>
+          <p:cNvSpPr>
+            <a:spLocks noGrp="1"/>
+          </p:cNvSpPr>
+          <p:nvPr>
+            <p:ph type="ctrTitle"/>
+          </p:nvPr>
+        </p:nvSpPr>
+        <p:spPr/>
+        <p:txBody>
+          <a:bodyPr>
+            <a:normAutofit fontScale="90000"/>
+          </a:bodyPr>
+          <a:lstStyle/>
+          <a:p>
+            <a:r>
+              <a:rPr lang="en-US" dirty="0"/>
+              <a:t>Incorporation into the OFDM modem</a:t>
+            </a:r>
+            <a:br>
+              <a:rPr lang="en-US" dirty="0"/>
+            </a:br>
+            <a:endParaRPr lang="en-US" dirty="0"/>
+          </a:p>
+        </p:txBody>
+      </p:sp>
+      <p:sp>
+        <p:nvSpPr>
+          <p:cNvPr id="3" name="Subtitle 2"/>
+          <p:cNvSpPr>
+            <a:spLocks noGrp="1"/>
+          </p:cNvSpPr>
+          <p:nvPr>
+            <p:ph type="subTitle" idx="1"/>
+          </p:nvPr>
+        </p:nvSpPr>
+        <p:spPr/>
+        <p:txBody>
+          <a:bodyPr/>
+          <a:lstStyle/>
+          <a:p>
+            <a:endParaRPr lang="en-US"/>
+          </a:p>
+        </p:txBody>
+      </p:sp>
+    </p:spTree>
+    <p:extLst>
+      <p:ext uri="{BB962C8B-B14F-4D97-AF65-F5344CB8AC3E}">
+        <p14:creationId xmlns:p14="http://schemas.microsoft.com/office/powerpoint/2010/main" val="1745580937"/>
+      </p:ext>
+    </p:extLst>
+  </p:cSld>
+  <p:clrMapOvr>
+    <a:masterClrMapping/>
+  </p:clrMapOvr>
+  <p:timing>
+    <p:tnLst>
+      <p:par>
+        <p:cTn id="1" dur="indefinite" restart="never" nodeType="tmRoot"/>
+      </p:par>
+    </p:tnLst>
+  </p:timing>
 </p:sld>
 </file>
 
@@ -8784,56 +9472,179 @@
             <a:spLocks noGrp="1"/>
           </p:cNvSpPr>
           <p:nvPr>
-            <p:ph type="ctrTitle"/>
+            <p:ph type="title"/>
           </p:nvPr>
         </p:nvSpPr>
         <p:spPr/>
         <p:txBody>
-          <a:bodyPr>
-            <a:normAutofit fontScale="90000"/>
-          </a:bodyPr>
-          <a:lstStyle/>
-          <a:p>
-            <a:r>
-              <a:rPr lang="en-US" dirty="0"/>
-              <a:t>Incorporation into the OFDM modem</a:t>
-            </a:r>
-            <a:br>
-              <a:rPr lang="en-US" dirty="0"/>
-            </a:br>
+          <a:bodyPr/>
+          <a:lstStyle/>
+          <a:p>
+            <a:r>
+              <a:rPr lang="en-US" dirty="0" smtClean="0"/>
+              <a:t>Difference between article and effective signal</a:t>
+            </a:r>
             <a:endParaRPr lang="en-US" dirty="0"/>
           </a:p>
         </p:txBody>
       </p:sp>
-      <p:sp>
-        <p:nvSpPr>
-          <p:cNvPr id="3" name="Subtitle 2"/>
-          <p:cNvSpPr>
-            <a:spLocks noGrp="1"/>
-          </p:cNvSpPr>
-          <p:nvPr>
-            <p:ph type="subTitle" idx="1"/>
-          </p:nvPr>
-        </p:nvSpPr>
-        <p:spPr/>
-        <p:txBody>
-          <a:bodyPr/>
-          <a:lstStyle/>
-          <a:p>
-            <a:endParaRPr lang="en-US"/>
-          </a:p>
-        </p:txBody>
-      </p:sp>
+      <p:pic>
+        <p:nvPicPr>
+          <p:cNvPr id="4" name="Picture 2"/>
+          <p:cNvPicPr>
+            <a:picLocks noChangeAspect="1" noChangeArrowheads="1"/>
+          </p:cNvPicPr>
+          <p:nvPr/>
+        </p:nvPicPr>
+        <p:blipFill>
+          <a:blip r:embed="rId2">
+            <a:extLst>
+              <a:ext uri="{28A0092B-C50C-407E-A947-70E740481C1C}">
+                <a14:useLocalDpi xmlns:a14="http://schemas.microsoft.com/office/drawing/2010/main" val="0"/>
+              </a:ext>
+            </a:extLst>
+          </a:blip>
+          <a:srcRect/>
+          <a:stretch>
+            <a:fillRect/>
+          </a:stretch>
+        </p:blipFill>
+        <p:spPr bwMode="auto">
+          <a:xfrm>
+            <a:off x="1248536" y="2578608"/>
+            <a:ext cx="9925391" cy="3163824"/>
+          </a:xfrm>
+          <a:prstGeom prst="rect">
+            <a:avLst/>
+          </a:prstGeom>
+          <a:noFill/>
+          <a:ln>
+            <a:noFill/>
+          </a:ln>
+          <a:effectLst/>
+          <a:extLst>
+            <a:ext uri="{909E8E84-426E-40DD-AFC4-6F175D3DCCD1}">
+              <a14:hiddenFill xmlns:a14="http://schemas.microsoft.com/office/drawing/2010/main">
+                <a:solidFill>
+                  <a:schemeClr val="accent1"/>
+                </a:solidFill>
+              </a14:hiddenFill>
+            </a:ext>
+            <a:ext uri="{91240B29-F687-4F45-9708-019B960494DF}">
+              <a14:hiddenLine xmlns:a14="http://schemas.microsoft.com/office/drawing/2010/main" w="9525">
+                <a:solidFill>
+                  <a:schemeClr val="tx1"/>
+                </a:solidFill>
+                <a:miter lim="800000"/>
+                <a:headEnd/>
+                <a:tailEnd/>
+              </a14:hiddenLine>
+            </a:ext>
+            <a:ext uri="{AF507438-7753-43E0-B8FC-AC1667EBCBE1}">
+              <a14:hiddenEffects xmlns:a14="http://schemas.microsoft.com/office/drawing/2010/main">
+                <a:effectLst>
+                  <a:outerShdw dist="35921" dir="2700000" algn="ctr" rotWithShape="0">
+                    <a:schemeClr val="bg2"/>
+                  </a:outerShdw>
+                </a:effectLst>
+              </a14:hiddenEffects>
+            </a:ext>
+          </a:extLst>
+        </p:spPr>
+      </p:pic>
     </p:spTree>
     <p:extLst>
       <p:ext uri="{BB962C8B-B14F-4D97-AF65-F5344CB8AC3E}">
-        <p14:creationId xmlns:p14="http://schemas.microsoft.com/office/powerpoint/2010/main" val="1745580937"/>
+        <p14:creationId xmlns:p14="http://schemas.microsoft.com/office/powerpoint/2010/main" val="720925226"/>
       </p:ext>
     </p:extLst>
   </p:cSld>
   <p:clrMapOvr>
     <a:masterClrMapping/>
   </p:clrMapOvr>
+  <p:timing>
+    <p:tnLst>
+      <p:par>
+        <p:cTn id="1" dur="indefinite" restart="never" nodeType="tmRoot">
+          <p:childTnLst>
+            <p:seq concurrent="1" nextAc="seek">
+              <p:cTn id="2" dur="indefinite" nodeType="mainSeq">
+                <p:childTnLst>
+                  <p:par>
+                    <p:cTn id="3" fill="hold">
+                      <p:stCondLst>
+                        <p:cond delay="indefinite"/>
+                      </p:stCondLst>
+                      <p:childTnLst>
+                        <p:par>
+                          <p:cTn id="4" fill="hold">
+                            <p:stCondLst>
+                              <p:cond delay="0"/>
+                            </p:stCondLst>
+                            <p:childTnLst>
+                              <p:par>
+                                <p:cTn id="5" presetID="10" presetClass="entr" presetSubtype="0" fill="hold" nodeType="clickEffect">
+                                  <p:stCondLst>
+                                    <p:cond delay="0"/>
+                                  </p:stCondLst>
+                                  <p:childTnLst>
+                                    <p:set>
+                                      <p:cBhvr>
+                                        <p:cTn id="6" dur="1" fill="hold">
+                                          <p:stCondLst>
+                                            <p:cond delay="0"/>
+                                          </p:stCondLst>
+                                        </p:cTn>
+                                        <p:tgtEl>
+                                          <p:spTgt spid="4"/>
+                                        </p:tgtEl>
+                                        <p:attrNameLst>
+                                          <p:attrName>style.visibility</p:attrName>
+                                        </p:attrNameLst>
+                                      </p:cBhvr>
+                                      <p:to>
+                                        <p:strVal val="visible"/>
+                                      </p:to>
+                                    </p:set>
+                                    <p:animEffect transition="in" filter="fade">
+                                      <p:cBhvr>
+                                        <p:cTn id="7" dur="500"/>
+                                        <p:tgtEl>
+                                          <p:spTgt spid="4"/>
+                                        </p:tgtEl>
+                                      </p:cBhvr>
+                                    </p:animEffect>
+                                  </p:childTnLst>
+                                </p:cTn>
+                              </p:par>
+                            </p:childTnLst>
+                          </p:cTn>
+                        </p:par>
+                      </p:childTnLst>
+                    </p:cTn>
+                  </p:par>
+                </p:childTnLst>
+              </p:cTn>
+              <p:prevCondLst>
+                <p:cond evt="onPrev" delay="0">
+                  <p:tgtEl>
+                    <p:sldTgt/>
+                  </p:tgtEl>
+                </p:cond>
+              </p:prevCondLst>
+              <p:nextCondLst>
+                <p:cond evt="onNext" delay="0">
+                  <p:tgtEl>
+                    <p:sldTgt/>
+                  </p:tgtEl>
+                </p:cond>
+              </p:nextCondLst>
+            </p:seq>
+          </p:childTnLst>
+        </p:cTn>
+      </p:par>
+    </p:tnLst>
+  </p:timing>
 </p:sld>
 </file>
 
@@ -8864,58 +9675,67 @@
             <p:ph type="title"/>
           </p:nvPr>
         </p:nvSpPr>
-        <p:spPr/>
+        <p:spPr>
+          <a:xfrm>
+            <a:off x="737616" y="154813"/>
+            <a:ext cx="10515600" cy="851027"/>
+          </a:xfrm>
+        </p:spPr>
         <p:txBody>
           <a:bodyPr/>
           <a:lstStyle/>
           <a:p>
             <a:r>
               <a:rPr lang="en-US" dirty="0" smtClean="0"/>
-              <a:t>Difference between article and effective signal</a:t>
+              <a:t>CCDF</a:t>
             </a:r>
             <a:endParaRPr lang="en-US" dirty="0"/>
           </a:p>
         </p:txBody>
       </p:sp>
-      <p:sp>
-        <p:nvSpPr>
-          <p:cNvPr id="3" name="Content Placeholder 2"/>
-          <p:cNvSpPr>
-            <a:spLocks noGrp="1"/>
-          </p:cNvSpPr>
+      <p:pic>
+        <p:nvPicPr>
+          <p:cNvPr id="4" name="Content Placeholder 3"/>
+          <p:cNvPicPr>
+            <a:picLocks noGrp="1" noChangeAspect="1"/>
+          </p:cNvPicPr>
           <p:nvPr>
             <p:ph idx="1"/>
           </p:nvPr>
-        </p:nvSpPr>
-        <p:spPr/>
-        <p:txBody>
-          <a:bodyPr/>
-          <a:lstStyle/>
-          <a:p>
-            <a:r>
-              <a:rPr lang="en-US" dirty="0" smtClean="0"/>
-              <a:t>Guard bands &amp; DC</a:t>
-            </a:r>
-          </a:p>
-          <a:p>
-            <a:r>
-              <a:rPr lang="en-US" dirty="0" smtClean="0"/>
-              <a:t>pilots</a:t>
-            </a:r>
-            <a:endParaRPr lang="en-US" dirty="0"/>
-          </a:p>
-        </p:txBody>
-      </p:sp>
+        </p:nvPicPr>
+        <p:blipFill>
+          <a:blip r:embed="rId2"/>
+          <a:stretch>
+            <a:fillRect/>
+          </a:stretch>
+        </p:blipFill>
+        <p:spPr>
+          <a:xfrm>
+            <a:off x="173736" y="1078992"/>
+            <a:ext cx="11686032" cy="5468112"/>
+          </a:xfrm>
+          <a:prstGeom prst="rect">
+            <a:avLst/>
+          </a:prstGeom>
+        </p:spPr>
+      </p:pic>
     </p:spTree>
     <p:extLst>
       <p:ext uri="{BB962C8B-B14F-4D97-AF65-F5344CB8AC3E}">
-        <p14:creationId xmlns:p14="http://schemas.microsoft.com/office/powerpoint/2010/main" val="720925226"/>
+        <p14:creationId xmlns:p14="http://schemas.microsoft.com/office/powerpoint/2010/main" val="2755725899"/>
       </p:ext>
     </p:extLst>
   </p:cSld>
   <p:clrMapOvr>
     <a:masterClrMapping/>
   </p:clrMapOvr>
+  <p:timing>
+    <p:tnLst>
+      <p:par>
+        <p:cTn id="1" dur="indefinite" restart="never" nodeType="tmRoot"/>
+      </p:par>
+    </p:tnLst>
+  </p:timing>
 </p:sld>
 </file>
 
@@ -8946,48 +9766,151 @@
             <p:ph type="title"/>
           </p:nvPr>
         </p:nvSpPr>
-        <p:spPr/>
+        <p:spPr>
+          <a:xfrm>
+            <a:off x="838200" y="106045"/>
+            <a:ext cx="10515600" cy="732155"/>
+          </a:xfrm>
+        </p:spPr>
         <p:txBody>
           <a:bodyPr/>
           <a:lstStyle/>
           <a:p>
             <a:r>
               <a:rPr lang="en-US" dirty="0" smtClean="0"/>
-              <a:t>CCDF</a:t>
+              <a:t>time</a:t>
             </a:r>
             <a:endParaRPr lang="en-US" dirty="0"/>
           </a:p>
         </p:txBody>
       </p:sp>
-      <p:sp>
-        <p:nvSpPr>
-          <p:cNvPr id="3" name="Content Placeholder 2"/>
-          <p:cNvSpPr>
-            <a:spLocks noGrp="1"/>
-          </p:cNvSpPr>
+      <p:pic>
+        <p:nvPicPr>
+          <p:cNvPr id="8" name="Content Placeholder 7"/>
+          <p:cNvPicPr>
+            <a:picLocks noGrp="1" noChangeAspect="1"/>
+          </p:cNvPicPr>
           <p:nvPr>
             <p:ph idx="1"/>
           </p:nvPr>
-        </p:nvSpPr>
-        <p:spPr/>
-        <p:txBody>
-          <a:bodyPr/>
-          <a:lstStyle/>
-          <a:p>
-            <a:endParaRPr lang="en-US"/>
+        </p:nvPicPr>
+        <p:blipFill>
+          <a:blip r:embed="rId2"/>
+          <a:stretch>
+            <a:fillRect/>
+          </a:stretch>
+        </p:blipFill>
+        <p:spPr>
+          <a:xfrm>
+            <a:off x="426721" y="838200"/>
+            <a:ext cx="11384280" cy="2670175"/>
+          </a:xfrm>
+          <a:prstGeom prst="rect">
+            <a:avLst/>
+          </a:prstGeom>
+        </p:spPr>
+      </p:pic>
+      <p:pic>
+        <p:nvPicPr>
+          <p:cNvPr id="9" name="Picture 8"/>
+          <p:cNvPicPr>
+            <a:picLocks noChangeAspect="1"/>
+          </p:cNvPicPr>
+          <p:nvPr/>
+        </p:nvPicPr>
+        <p:blipFill>
+          <a:blip r:embed="rId3"/>
+          <a:stretch>
+            <a:fillRect/>
+          </a:stretch>
+        </p:blipFill>
+        <p:spPr>
+          <a:xfrm>
+            <a:off x="563880" y="3508375"/>
+            <a:ext cx="11430000" cy="3136265"/>
+          </a:xfrm>
+          <a:prstGeom prst="rect">
+            <a:avLst/>
+          </a:prstGeom>
+        </p:spPr>
+      </p:pic>
+      <p:sp>
+        <p:nvSpPr>
+          <p:cNvPr id="10" name="TextBox 9"/>
+          <p:cNvSpPr txBox="1"/>
+          <p:nvPr/>
+        </p:nvSpPr>
+        <p:spPr>
+          <a:xfrm>
+            <a:off x="393527" y="5030469"/>
+            <a:ext cx="777200" cy="369332"/>
+          </a:xfrm>
+          <a:prstGeom prst="rect">
+            <a:avLst/>
+          </a:prstGeom>
+          <a:noFill/>
+        </p:spPr>
+        <p:txBody>
+          <a:bodyPr wrap="none" rtlCol="0">
+            <a:spAutoFit/>
+          </a:bodyPr>
+          <a:lstStyle/>
+          <a:p>
+            <a:r>
+              <a:rPr lang="en-US" dirty="0" smtClean="0"/>
+              <a:t>W PTS</a:t>
+            </a:r>
+            <a:endParaRPr lang="en-US" dirty="0"/>
+          </a:p>
+        </p:txBody>
+      </p:sp>
+      <p:sp>
+        <p:nvSpPr>
+          <p:cNvPr id="11" name="TextBox 10"/>
+          <p:cNvSpPr txBox="1"/>
+          <p:nvPr/>
+        </p:nvSpPr>
+        <p:spPr>
+          <a:xfrm>
+            <a:off x="243842" y="1988621"/>
+            <a:ext cx="889346" cy="369332"/>
+          </a:xfrm>
+          <a:prstGeom prst="rect">
+            <a:avLst/>
+          </a:prstGeom>
+          <a:noFill/>
+        </p:spPr>
+        <p:txBody>
+          <a:bodyPr wrap="none" rtlCol="0">
+            <a:spAutoFit/>
+          </a:bodyPr>
+          <a:lstStyle/>
+          <a:p>
+            <a:r>
+              <a:rPr lang="en-US" dirty="0" smtClean="0"/>
+              <a:t>Wo PTS</a:t>
+            </a:r>
+            <a:endParaRPr lang="en-US" dirty="0"/>
           </a:p>
         </p:txBody>
       </p:sp>
     </p:spTree>
     <p:extLst>
       <p:ext uri="{BB962C8B-B14F-4D97-AF65-F5344CB8AC3E}">
-        <p14:creationId xmlns:p14="http://schemas.microsoft.com/office/powerpoint/2010/main" val="2755725899"/>
+        <p14:creationId xmlns:p14="http://schemas.microsoft.com/office/powerpoint/2010/main" val="2241926003"/>
       </p:ext>
     </p:extLst>
   </p:cSld>
   <p:clrMapOvr>
     <a:masterClrMapping/>
   </p:clrMapOvr>
+  <p:timing>
+    <p:tnLst>
+      <p:par>
+        <p:cTn id="1" dur="indefinite" restart="never" nodeType="tmRoot"/>
+      </p:par>
+    </p:tnLst>
+  </p:timing>
 </p:sld>
 </file>
 
@@ -9176,7 +10099,7 @@
           <a:graphicData uri="http://schemas.openxmlformats.org/presentationml/2006/ole">
             <mc:AlternateContent xmlns:mc="http://schemas.openxmlformats.org/markup-compatibility/2006">
               <mc:Choice xmlns:v="urn:schemas-microsoft-com:vml" Requires="v">
-                <p:oleObj spid="_x0000_s1073" name="Equation" r:id="rId4" imgW="1562040" imgH="444240" progId="Equation.DSMT4">
+                <p:oleObj spid="_x0000_s1086" name="Equation" r:id="rId4" imgW="1562040" imgH="444240" progId="Equation.DSMT4">
                   <p:embed/>
                 </p:oleObj>
               </mc:Choice>
@@ -9334,48 +10257,159 @@
             <p:ph type="title"/>
           </p:nvPr>
         </p:nvSpPr>
-        <p:spPr/>
-        <p:txBody>
-          <a:bodyPr/>
-          <a:lstStyle/>
-          <a:p>
-            <a:r>
-              <a:rPr lang="en-US" dirty="0" smtClean="0"/>
-              <a:t>spectrum</a:t>
+        <p:spPr>
+          <a:xfrm>
+            <a:off x="182880" y="182245"/>
+            <a:ext cx="10515600" cy="640715"/>
+          </a:xfrm>
+        </p:spPr>
+        <p:txBody>
+          <a:bodyPr>
+            <a:normAutofit fontScale="90000"/>
+          </a:bodyPr>
+          <a:lstStyle/>
+          <a:p>
+            <a:r>
+              <a:rPr lang="en-US" dirty="0" smtClean="0"/>
+              <a:t>EVM (</a:t>
+            </a:r>
+            <a:r>
+              <a:rPr lang="en-US" dirty="0" err="1" smtClean="0"/>
+              <a:t>EsNo</a:t>
+            </a:r>
+            <a:r>
+              <a:rPr lang="en-US" dirty="0" smtClean="0"/>
+              <a:t>=40dB, no multipath)</a:t>
             </a:r>
             <a:endParaRPr lang="en-US" dirty="0"/>
           </a:p>
         </p:txBody>
       </p:sp>
-      <p:sp>
-        <p:nvSpPr>
-          <p:cNvPr id="3" name="Content Placeholder 2"/>
-          <p:cNvSpPr>
-            <a:spLocks noGrp="1"/>
-          </p:cNvSpPr>
-          <p:nvPr>
-            <p:ph idx="1"/>
-          </p:nvPr>
-        </p:nvSpPr>
-        <p:spPr/>
-        <p:txBody>
-          <a:bodyPr/>
-          <a:lstStyle/>
-          <a:p>
-            <a:endParaRPr lang="en-US"/>
+      <p:pic>
+        <p:nvPicPr>
+          <p:cNvPr id="7" name="Picture 6"/>
+          <p:cNvPicPr>
+            <a:picLocks noChangeAspect="1"/>
+          </p:cNvPicPr>
+          <p:nvPr/>
+        </p:nvPicPr>
+        <p:blipFill>
+          <a:blip r:embed="rId2"/>
+          <a:stretch>
+            <a:fillRect/>
+          </a:stretch>
+        </p:blipFill>
+        <p:spPr>
+          <a:xfrm>
+            <a:off x="471487" y="1690689"/>
+            <a:ext cx="5395913" cy="4740592"/>
+          </a:xfrm>
+          <a:prstGeom prst="rect">
+            <a:avLst/>
+          </a:prstGeom>
+        </p:spPr>
+      </p:pic>
+      <p:sp>
+        <p:nvSpPr>
+          <p:cNvPr id="8" name="TextBox 7"/>
+          <p:cNvSpPr txBox="1"/>
+          <p:nvPr/>
+        </p:nvSpPr>
+        <p:spPr>
+          <a:xfrm>
+            <a:off x="2743200" y="1051560"/>
+            <a:ext cx="889346" cy="369332"/>
+          </a:xfrm>
+          <a:prstGeom prst="rect">
+            <a:avLst/>
+          </a:prstGeom>
+          <a:noFill/>
+        </p:spPr>
+        <p:txBody>
+          <a:bodyPr wrap="none" rtlCol="0">
+            <a:spAutoFit/>
+          </a:bodyPr>
+          <a:lstStyle/>
+          <a:p>
+            <a:r>
+              <a:rPr lang="en-US" dirty="0" smtClean="0"/>
+              <a:t>Wo PTS</a:t>
+            </a:r>
+            <a:endParaRPr lang="en-US" dirty="0"/>
+          </a:p>
+        </p:txBody>
+      </p:sp>
+      <p:pic>
+        <p:nvPicPr>
+          <p:cNvPr id="9" name="Picture 8"/>
+          <p:cNvPicPr>
+            <a:picLocks noChangeAspect="1"/>
+          </p:cNvPicPr>
+          <p:nvPr/>
+        </p:nvPicPr>
+        <p:blipFill>
+          <a:blip r:embed="rId3"/>
+          <a:stretch>
+            <a:fillRect/>
+          </a:stretch>
+        </p:blipFill>
+        <p:spPr>
+          <a:xfrm>
+            <a:off x="6084570" y="1690689"/>
+            <a:ext cx="5970270" cy="4740592"/>
+          </a:xfrm>
+          <a:prstGeom prst="rect">
+            <a:avLst/>
+          </a:prstGeom>
+        </p:spPr>
+      </p:pic>
+      <p:sp>
+        <p:nvSpPr>
+          <p:cNvPr id="10" name="TextBox 9"/>
+          <p:cNvSpPr txBox="1"/>
+          <p:nvPr/>
+        </p:nvSpPr>
+        <p:spPr>
+          <a:xfrm>
+            <a:off x="8442960" y="1051560"/>
+            <a:ext cx="2861296" cy="369332"/>
+          </a:xfrm>
+          <a:prstGeom prst="rect">
+            <a:avLst/>
+          </a:prstGeom>
+          <a:noFill/>
+        </p:spPr>
+        <p:txBody>
+          <a:bodyPr wrap="none" rtlCol="0">
+            <a:spAutoFit/>
+          </a:bodyPr>
+          <a:lstStyle/>
+          <a:p>
+            <a:r>
+              <a:rPr lang="en-US" dirty="0" smtClean="0"/>
+              <a:t>W PTS (Reduced complexity)</a:t>
+            </a:r>
+            <a:endParaRPr lang="en-US" dirty="0"/>
           </a:p>
         </p:txBody>
       </p:sp>
     </p:spTree>
     <p:extLst>
       <p:ext uri="{BB962C8B-B14F-4D97-AF65-F5344CB8AC3E}">
-        <p14:creationId xmlns:p14="http://schemas.microsoft.com/office/powerpoint/2010/main" val="3533786511"/>
+        <p14:creationId xmlns:p14="http://schemas.microsoft.com/office/powerpoint/2010/main" val="1680015463"/>
       </p:ext>
     </p:extLst>
   </p:cSld>
   <p:clrMapOvr>
     <a:masterClrMapping/>
   </p:clrMapOvr>
+  <p:timing>
+    <p:tnLst>
+      <p:par>
+        <p:cTn id="1" dur="indefinite" restart="never" nodeType="tmRoot"/>
+      </p:par>
+    </p:tnLst>
+  </p:timing>
 </p:sld>
 </file>
 
@@ -9406,192 +10440,48 @@
             <p:ph type="title"/>
           </p:nvPr>
         </p:nvSpPr>
-        <p:spPr/>
+        <p:spPr>
+          <a:xfrm>
+            <a:off x="259080" y="136525"/>
+            <a:ext cx="10515600" cy="1067435"/>
+          </a:xfrm>
+        </p:spPr>
         <p:txBody>
           <a:bodyPr/>
           <a:lstStyle/>
           <a:p>
             <a:r>
               <a:rPr lang="en-US" dirty="0" smtClean="0"/>
-              <a:t>time</a:t>
+              <a:t>Scrambling method</a:t>
             </a:r>
             <a:endParaRPr lang="en-US" dirty="0"/>
           </a:p>
         </p:txBody>
       </p:sp>
-      <p:sp>
-        <p:nvSpPr>
-          <p:cNvPr id="3" name="Content Placeholder 2"/>
-          <p:cNvSpPr>
-            <a:spLocks noGrp="1"/>
-          </p:cNvSpPr>
-          <p:nvPr>
-            <p:ph idx="1"/>
-          </p:nvPr>
-        </p:nvSpPr>
-        <p:spPr/>
-        <p:txBody>
-          <a:bodyPr/>
-          <a:lstStyle/>
-          <a:p>
-            <a:endParaRPr lang="en-US"/>
-          </a:p>
-        </p:txBody>
-      </p:sp>
-    </p:spTree>
-    <p:extLst>
-      <p:ext uri="{BB962C8B-B14F-4D97-AF65-F5344CB8AC3E}">
-        <p14:creationId xmlns:p14="http://schemas.microsoft.com/office/powerpoint/2010/main" val="2241926003"/>
-      </p:ext>
-    </p:extLst>
-  </p:cSld>
-  <p:clrMapOvr>
-    <a:masterClrMapping/>
-  </p:clrMapOvr>
-</p:sld>
-</file>
-
-<file path=ppt/slides/slide42.xml><?xml version="1.0" encoding="utf-8"?>
-<p:sld xmlns:a="http://schemas.openxmlformats.org/drawingml/2006/main" xmlns:r="http://schemas.openxmlformats.org/officeDocument/2006/relationships" xmlns:p="http://schemas.openxmlformats.org/presentationml/2006/main">
-  <p:cSld>
-    <p:spTree>
-      <p:nvGrpSpPr>
-        <p:cNvPr id="1" name=""/>
-        <p:cNvGrpSpPr/>
-        <p:nvPr/>
-      </p:nvGrpSpPr>
-      <p:grpSpPr>
-        <a:xfrm>
-          <a:off x="0" y="0"/>
-          <a:ext cx="0" cy="0"/>
-          <a:chOff x="0" y="0"/>
-          <a:chExt cx="0" cy="0"/>
-        </a:xfrm>
-      </p:grpSpPr>
-      <p:sp>
-        <p:nvSpPr>
-          <p:cNvPr id="2" name="Title 1"/>
-          <p:cNvSpPr>
-            <a:spLocks noGrp="1"/>
-          </p:cNvSpPr>
-          <p:nvPr>
-            <p:ph type="title"/>
-          </p:nvPr>
-        </p:nvSpPr>
-        <p:spPr/>
-        <p:txBody>
-          <a:bodyPr/>
-          <a:lstStyle/>
-          <a:p>
-            <a:r>
-              <a:rPr lang="en-US" dirty="0" smtClean="0"/>
-              <a:t>EVM</a:t>
-            </a:r>
-            <a:endParaRPr lang="en-US" dirty="0"/>
-          </a:p>
-        </p:txBody>
-      </p:sp>
-      <p:sp>
-        <p:nvSpPr>
-          <p:cNvPr id="3" name="Content Placeholder 2"/>
-          <p:cNvSpPr>
-            <a:spLocks noGrp="1"/>
-          </p:cNvSpPr>
-          <p:nvPr>
-            <p:ph idx="1"/>
-          </p:nvPr>
-        </p:nvSpPr>
-        <p:spPr/>
-        <p:txBody>
-          <a:bodyPr/>
-          <a:lstStyle/>
-          <a:p>
-            <a:endParaRPr lang="en-US"/>
-          </a:p>
-        </p:txBody>
-      </p:sp>
-    </p:spTree>
-    <p:extLst>
-      <p:ext uri="{BB962C8B-B14F-4D97-AF65-F5344CB8AC3E}">
-        <p14:creationId xmlns:p14="http://schemas.microsoft.com/office/powerpoint/2010/main" val="1680015463"/>
-      </p:ext>
-    </p:extLst>
-  </p:cSld>
-  <p:clrMapOvr>
-    <a:masterClrMapping/>
-  </p:clrMapOvr>
-</p:sld>
-</file>
-
-<file path=ppt/slides/slide43.xml><?xml version="1.0" encoding="utf-8"?>
-<p:sld xmlns:a="http://schemas.openxmlformats.org/drawingml/2006/main" xmlns:r="http://schemas.openxmlformats.org/officeDocument/2006/relationships" xmlns:p="http://schemas.openxmlformats.org/presentationml/2006/main">
-  <p:cSld>
-    <p:spTree>
-      <p:nvGrpSpPr>
-        <p:cNvPr id="1" name=""/>
-        <p:cNvGrpSpPr/>
-        <p:nvPr/>
-      </p:nvGrpSpPr>
-      <p:grpSpPr>
-        <a:xfrm>
-          <a:off x="0" y="0"/>
-          <a:ext cx="0" cy="0"/>
-          <a:chOff x="0" y="0"/>
-          <a:chExt cx="0" cy="0"/>
-        </a:xfrm>
-      </p:grpSpPr>
-      <p:sp>
-        <p:nvSpPr>
-          <p:cNvPr id="2" name="Title 1"/>
-          <p:cNvSpPr>
-            <a:spLocks noGrp="1"/>
-          </p:cNvSpPr>
-          <p:nvPr>
-            <p:ph type="title"/>
-          </p:nvPr>
-        </p:nvSpPr>
-        <p:spPr/>
-        <p:txBody>
-          <a:bodyPr/>
-          <a:lstStyle/>
-          <a:p>
-            <a:r>
-              <a:rPr lang="en-US" dirty="0" smtClean="0"/>
-              <a:t>Scrambling method</a:t>
-            </a:r>
-            <a:endParaRPr lang="en-US" dirty="0"/>
-          </a:p>
-        </p:txBody>
-      </p:sp>
-      <p:sp>
-        <p:nvSpPr>
-          <p:cNvPr id="3" name="Content Placeholder 2"/>
-          <p:cNvSpPr>
-            <a:spLocks noGrp="1"/>
-          </p:cNvSpPr>
-          <p:nvPr>
-            <p:ph idx="1"/>
-          </p:nvPr>
-        </p:nvSpPr>
-        <p:spPr/>
-        <p:txBody>
-          <a:bodyPr/>
-          <a:lstStyle/>
-          <a:p>
-            <a:r>
-              <a:rPr lang="en-US" dirty="0" smtClean="0"/>
-              <a:t>Contiguous</a:t>
-            </a:r>
-          </a:p>
-          <a:p>
-            <a:r>
-              <a:rPr lang="en-US" dirty="0" smtClean="0"/>
-              <a:t>scrambled</a:t>
-            </a:r>
-            <a:endParaRPr lang="en-US" dirty="0"/>
-          </a:p>
-        </p:txBody>
-      </p:sp>
+      <p:pic>
+        <p:nvPicPr>
+          <p:cNvPr id="5" name="Picture 4"/>
+          <p:cNvPicPr>
+            <a:picLocks noChangeAspect="1"/>
+          </p:cNvPicPr>
+          <p:nvPr/>
+        </p:nvPicPr>
+        <p:blipFill>
+          <a:blip r:embed="rId2"/>
+          <a:stretch>
+            <a:fillRect/>
+          </a:stretch>
+        </p:blipFill>
+        <p:spPr>
+          <a:xfrm>
+            <a:off x="533400" y="1203960"/>
+            <a:ext cx="11369040" cy="5455920"/>
+          </a:xfrm>
+          <a:prstGeom prst="rect">
+            <a:avLst/>
+          </a:prstGeom>
+        </p:spPr>
+      </p:pic>
     </p:spTree>
     <p:extLst>
       <p:ext uri="{BB962C8B-B14F-4D97-AF65-F5344CB8AC3E}">
@@ -9602,10 +10492,17 @@
   <p:clrMapOvr>
     <a:masterClrMapping/>
   </p:clrMapOvr>
+  <p:timing>
+    <p:tnLst>
+      <p:par>
+        <p:cTn id="1" dur="indefinite" restart="never" nodeType="tmRoot"/>
+      </p:par>
+    </p:tnLst>
+  </p:timing>
 </p:sld>
 </file>
 
-<file path=ppt/slides/slide44.xml><?xml version="1.0" encoding="utf-8"?>
+<file path=ppt/slides/slide42.xml><?xml version="1.0" encoding="utf-8"?>
 <p:sld xmlns:a="http://schemas.openxmlformats.org/drawingml/2006/main" xmlns:r="http://schemas.openxmlformats.org/officeDocument/2006/relationships" xmlns:p="http://schemas.openxmlformats.org/presentationml/2006/main">
   <p:cSld>
     <p:spTree>
@@ -9965,7 +10862,7 @@
           <a:graphicData uri="http://schemas.openxmlformats.org/presentationml/2006/ole">
             <mc:AlternateContent xmlns:mc="http://schemas.openxmlformats.org/markup-compatibility/2006">
               <mc:Choice xmlns:v="urn:schemas-microsoft-com:vml" Requires="v">
-                <p:oleObj spid="_x0000_s4140" name="Equation" r:id="rId4" imgW="1562040" imgH="444240" progId="Equation.DSMT4">
+                <p:oleObj spid="_x0000_s4153" name="Equation" r:id="rId4" imgW="1562040" imgH="444240" progId="Equation.DSMT4">
                   <p:embed/>
                 </p:oleObj>
               </mc:Choice>
@@ -10034,6 +10931,13 @@
   <p:clrMapOvr>
     <a:masterClrMapping/>
   </p:clrMapOvr>
+  <p:timing>
+    <p:tnLst>
+      <p:par>
+        <p:cTn id="1" dur="indefinite" restart="never" nodeType="tmRoot"/>
+      </p:par>
+    </p:tnLst>
+  </p:timing>
 </p:sld>
 </file>
 
@@ -10064,7 +10968,12 @@
             <p:ph type="title"/>
           </p:nvPr>
         </p:nvSpPr>
-        <p:spPr/>
+        <p:spPr>
+          <a:xfrm>
+            <a:off x="320040" y="151765"/>
+            <a:ext cx="10515600" cy="975995"/>
+          </a:xfrm>
+        </p:spPr>
         <p:txBody>
           <a:bodyPr/>
           <a:lstStyle/>
@@ -10087,15 +10996,99 @@
             <p:ph idx="1"/>
           </p:nvPr>
         </p:nvSpPr>
-        <p:spPr/>
+        <p:spPr>
+          <a:xfrm>
+            <a:off x="487680" y="1249680"/>
+            <a:ext cx="7025640" cy="4927283"/>
+          </a:xfrm>
+        </p:spPr>
         <p:txBody>
           <a:bodyPr/>
           <a:lstStyle/>
           <a:p>
-            <a:endParaRPr lang="en-US"/>
-          </a:p>
-        </p:txBody>
-      </p:sp>
+            <a:r>
+              <a:rPr lang="en-US" dirty="0" smtClean="0"/>
+              <a:t>PAPR trades-off signal quality Vs. Range and Power consumption</a:t>
+            </a:r>
+          </a:p>
+          <a:p>
+            <a:r>
+              <a:rPr lang="en-US" dirty="0" smtClean="0"/>
+              <a:t>Saturating PA causes:</a:t>
+            </a:r>
+          </a:p>
+          <a:p>
+            <a:pPr lvl="1"/>
+            <a:r>
+              <a:rPr lang="en-US" dirty="0" smtClean="0"/>
+              <a:t>Distortion</a:t>
+            </a:r>
+          </a:p>
+          <a:p>
+            <a:pPr lvl="1"/>
+            <a:r>
+              <a:rPr lang="en-US" dirty="0" smtClean="0"/>
+              <a:t>Loss of orthogonality (ICI)</a:t>
+            </a:r>
+          </a:p>
+          <a:p>
+            <a:pPr lvl="1"/>
+            <a:r>
+              <a:rPr lang="en-US" dirty="0" smtClean="0"/>
+              <a:t>Spectral leakage to adjacent channels</a:t>
+            </a:r>
+          </a:p>
+          <a:p>
+            <a:r>
+              <a:rPr lang="en-US" dirty="0" smtClean="0"/>
+              <a:t>Increasing</a:t>
+            </a:r>
+            <a:r>
+              <a:rPr lang="en-US" dirty="0" smtClean="0"/>
+              <a:t> PA’s compression point increases power consumption</a:t>
+            </a:r>
+          </a:p>
+          <a:p>
+            <a:r>
+              <a:rPr lang="en-US" dirty="0" smtClean="0"/>
+              <a:t>Not saturation nor Increasing: compromise on </a:t>
+            </a:r>
+            <a:r>
+              <a:rPr lang="en-US" dirty="0" err="1" smtClean="0"/>
+              <a:t>Pavg</a:t>
+            </a:r>
+            <a:r>
+              <a:rPr lang="en-US" dirty="0" smtClean="0"/>
+              <a:t>, thus on Range</a:t>
+            </a:r>
+            <a:endParaRPr lang="en-US" dirty="0"/>
+          </a:p>
+        </p:txBody>
+      </p:sp>
+      <p:pic>
+        <p:nvPicPr>
+          <p:cNvPr id="4" name="Picture 3"/>
+          <p:cNvPicPr>
+            <a:picLocks noChangeAspect="1"/>
+          </p:cNvPicPr>
+          <p:nvPr/>
+        </p:nvPicPr>
+        <p:blipFill>
+          <a:blip r:embed="rId2"/>
+          <a:stretch>
+            <a:fillRect/>
+          </a:stretch>
+        </p:blipFill>
+        <p:spPr>
+          <a:xfrm>
+            <a:off x="7696201" y="1249680"/>
+            <a:ext cx="4114800" cy="4785360"/>
+          </a:xfrm>
+          <a:prstGeom prst="rect">
+            <a:avLst/>
+          </a:prstGeom>
+        </p:spPr>
+      </p:pic>
     </p:spTree>
     <p:extLst>
       <p:ext uri="{BB962C8B-B14F-4D97-AF65-F5344CB8AC3E}">
@@ -10106,6 +11099,13 @@
   <p:clrMapOvr>
     <a:masterClrMapping/>
   </p:clrMapOvr>
+  <p:timing>
+    <p:tnLst>
+      <p:par>
+        <p:cTn id="1" dur="indefinite" restart="never" nodeType="tmRoot"/>
+      </p:par>
+    </p:tnLst>
+  </p:timing>
 </p:sld>
 </file>
 
@@ -10178,6 +11178,13 @@
   <p:clrMapOvr>
     <a:masterClrMapping/>
   </p:clrMapOvr>
+  <p:timing>
+    <p:tnLst>
+      <p:par>
+        <p:cTn id="1" dur="indefinite" restart="never" nodeType="tmRoot"/>
+      </p:par>
+    </p:tnLst>
+  </p:timing>
 </p:sld>
 </file>
 
@@ -10208,7 +11215,12 @@
             <p:ph type="title"/>
           </p:nvPr>
         </p:nvSpPr>
-        <p:spPr/>
+        <p:spPr>
+          <a:xfrm>
+            <a:off x="838200" y="365125"/>
+            <a:ext cx="10515600" cy="975995"/>
+          </a:xfrm>
+        </p:spPr>
         <p:txBody>
           <a:bodyPr/>
           <a:lstStyle/>
@@ -10221,22 +11233,91 @@
           </a:p>
         </p:txBody>
       </p:sp>
-      <p:sp>
-        <p:nvSpPr>
-          <p:cNvPr id="3" name="Content Placeholder 2"/>
-          <p:cNvSpPr>
-            <a:spLocks noGrp="1"/>
-          </p:cNvSpPr>
+      <p:graphicFrame>
+        <p:nvGraphicFramePr>
+          <p:cNvPr id="4" name="Content Placeholder 3"/>
+          <p:cNvGraphicFramePr>
+            <a:graphicFrameLocks noGrp="1" noChangeAspect="1"/>
+          </p:cNvGraphicFramePr>
           <p:nvPr>
             <p:ph idx="1"/>
-          </p:nvPr>
-        </p:nvSpPr>
-        <p:spPr/>
-        <p:txBody>
-          <a:bodyPr/>
-          <a:lstStyle/>
-          <a:p>
-            <a:endParaRPr lang="en-US" dirty="0"/>
+            <p:extLst>
+              <p:ext uri="{D42A27DB-BD31-4B8C-83A1-F6EECF244321}">
+                <p14:modId xmlns:p14="http://schemas.microsoft.com/office/powerpoint/2010/main" val="3413391354"/>
+              </p:ext>
+            </p:extLst>
+          </p:nvPr>
+        </p:nvGraphicFramePr>
+        <p:xfrm>
+          <a:off x="1999298" y="2895600"/>
+          <a:ext cx="6858220" cy="2761298"/>
+        </p:xfrm>
+        <a:graphic>
+          <a:graphicData uri="http://schemas.openxmlformats.org/presentationml/2006/ole">
+            <mc:AlternateContent xmlns:mc="http://schemas.openxmlformats.org/markup-compatibility/2006">
+              <mc:Choice xmlns:v="urn:schemas-microsoft-com:vml" Requires="v">
+                <p:oleObj spid="_x0000_s12297" name="Equation" r:id="rId3" imgW="1892160" imgH="761760" progId="Equation.DSMT4">
+                  <p:embed/>
+                </p:oleObj>
+              </mc:Choice>
+              <mc:Fallback>
+                <p:oleObj name="Equation" r:id="rId3" imgW="1892160" imgH="761760" progId="Equation.DSMT4">
+                  <p:embed/>
+                  <p:pic>
+                    <p:nvPicPr>
+                      <p:cNvPr id="0" name=""/>
+                      <p:cNvPicPr/>
+                      <p:nvPr/>
+                    </p:nvPicPr>
+                    <p:blipFill>
+                      <a:blip r:embed="rId4"/>
+                      <a:stretch>
+                        <a:fillRect/>
+                      </a:stretch>
+                    </p:blipFill>
+                    <p:spPr>
+                      <a:xfrm>
+                        <a:off x="1999298" y="2895600"/>
+                        <a:ext cx="6858220" cy="2761298"/>
+                      </a:xfrm>
+                      <a:prstGeom prst="rect">
+                        <a:avLst/>
+                      </a:prstGeom>
+                    </p:spPr>
+                  </p:pic>
+                </p:oleObj>
+              </mc:Fallback>
+            </mc:AlternateContent>
+          </a:graphicData>
+        </a:graphic>
+      </p:graphicFrame>
+      <p:sp>
+        <p:nvSpPr>
+          <p:cNvPr id="5" name="TextBox 4"/>
+          <p:cNvSpPr txBox="1"/>
+          <p:nvPr/>
+        </p:nvSpPr>
+        <p:spPr>
+          <a:xfrm>
+            <a:off x="838200" y="1737360"/>
+            <a:ext cx="9843592" cy="523220"/>
+          </a:xfrm>
+          <a:prstGeom prst="rect">
+            <a:avLst/>
+          </a:prstGeom>
+          <a:noFill/>
+        </p:spPr>
+        <p:txBody>
+          <a:bodyPr wrap="none" rtlCol="0">
+            <a:spAutoFit/>
+          </a:bodyPr>
+          <a:lstStyle/>
+          <a:p>
+            <a:r>
+              <a:rPr lang="en-US" sz="2800" dirty="0" smtClean="0"/>
+              <a:t>For an OFDM block composed of N symbols of duration T seconds;</a:t>
+            </a:r>
+            <a:endParaRPr lang="en-US" sz="2800" dirty="0"/>
           </a:p>
         </p:txBody>
       </p:sp>
@@ -10250,6 +11331,13 @@
   <p:clrMapOvr>
     <a:masterClrMapping/>
   </p:clrMapOvr>
+  <p:timing>
+    <p:tnLst>
+      <p:par>
+        <p:cTn id="1" dur="indefinite" restart="never" nodeType="tmRoot"/>
+      </p:par>
+    </p:tnLst>
+  </p:timing>
 </p:sld>
 </file>
 
@@ -10377,7 +11465,7 @@
           <a:graphicData uri="http://schemas.openxmlformats.org/presentationml/2006/ole">
             <mc:AlternateContent xmlns:mc="http://schemas.openxmlformats.org/markup-compatibility/2006">
               <mc:Choice xmlns:v="urn:schemas-microsoft-com:vml" Requires="v">
-                <p:oleObj spid="_x0000_s5251" name="Equation" r:id="rId3" imgW="1117440" imgH="291960" progId="Equation.DSMT4">
+                <p:oleObj spid="_x0000_s5293" name="Equation" r:id="rId3" imgW="1117440" imgH="291960" progId="Equation.DSMT4">
                   <p:embed/>
                 </p:oleObj>
               </mc:Choice>
@@ -10434,7 +11522,7 @@
           <a:graphicData uri="http://schemas.openxmlformats.org/presentationml/2006/ole">
             <mc:AlternateContent xmlns:mc="http://schemas.openxmlformats.org/markup-compatibility/2006">
               <mc:Choice xmlns:v="urn:schemas-microsoft-com:vml" Requires="v">
-                <p:oleObj spid="_x0000_s5252" name="Equation" r:id="rId5" imgW="1625400" imgH="457200" progId="Equation.DSMT4">
+                <p:oleObj spid="_x0000_s5294" name="Equation" r:id="rId5" imgW="1625400" imgH="457200" progId="Equation.DSMT4">
                   <p:embed/>
                 </p:oleObj>
               </mc:Choice>
@@ -10491,7 +11579,7 @@
           <a:graphicData uri="http://schemas.openxmlformats.org/presentationml/2006/ole">
             <mc:AlternateContent xmlns:mc="http://schemas.openxmlformats.org/markup-compatibility/2006">
               <mc:Choice xmlns:v="urn:schemas-microsoft-com:vml" Requires="v">
-                <p:oleObj spid="_x0000_s5253" name="Equation" r:id="rId7" imgW="1930320" imgH="495000" progId="Equation.DSMT4">
+                <p:oleObj spid="_x0000_s5295" name="Equation" r:id="rId7" imgW="1930320" imgH="495000" progId="Equation.DSMT4">
                   <p:embed/>
                 </p:oleObj>
               </mc:Choice>
@@ -10536,6 +11624,13 @@
   <p:clrMapOvr>
     <a:masterClrMapping/>
   </p:clrMapOvr>
+  <p:timing>
+    <p:tnLst>
+      <p:par>
+        <p:cTn id="1" dur="indefinite" restart="never" nodeType="tmRoot"/>
+      </p:par>
+    </p:tnLst>
+  </p:timing>
 </p:sld>
 </file>
 

</xml_diff>